<commit_message>
New ppt, added technical appendix
</commit_message>
<xml_diff>
--- a/Mpox_education_PPT.pptx
+++ b/Mpox_education_PPT.pptx
@@ -5,7 +5,7 @@
     <p:sldMasterId id="2147483648" r:id="rId1"/>
   </p:sldMasterIdLst>
   <p:notesMasterIdLst>
-    <p:notesMasterId r:id="rId18"/>
+    <p:notesMasterId r:id="rId21"/>
   </p:notesMasterIdLst>
   <p:sldIdLst>
     <p:sldId id="256" r:id="rId2"/>
@@ -23,7 +23,10 @@
     <p:sldId id="265" r:id="rId14"/>
     <p:sldId id="262" r:id="rId15"/>
     <p:sldId id="263" r:id="rId16"/>
-    <p:sldId id="274" r:id="rId17"/>
+    <p:sldId id="277" r:id="rId17"/>
+    <p:sldId id="278" r:id="rId18"/>
+    <p:sldId id="279" r:id="rId19"/>
+    <p:sldId id="280" r:id="rId20"/>
   </p:sldIdLst>
   <p:sldSz cx="9144000" cy="5143500" type="screen16x9"/>
   <p:notesSz cx="9144000" cy="5143500"/>
@@ -190,7 +193,7 @@
             </a:lvl1pPr>
           </a:lstStyle>
           <a:p>
-            <a:endParaRPr lang="en-CA"/>
+            <a:endParaRPr lang="en-CA" dirty="0"/>
           </a:p>
         </p:txBody>
       </p:sp>
@@ -225,7 +228,7 @@
               <a:rPr lang="en-CA" smtClean="0"/>
               <a:t>2023-04-05</a:t>
             </a:fld>
-            <a:endParaRPr lang="en-CA"/>
+            <a:endParaRPr lang="en-CA" dirty="0"/>
           </a:p>
         </p:txBody>
       </p:sp>
@@ -258,7 +261,7 @@
           <a:bodyPr vert="horz" lIns="91440" tIns="45720" rIns="91440" bIns="45720" rtlCol="0" anchor="ctr"/>
           <a:lstStyle/>
           <a:p>
-            <a:endParaRPr lang="en-CA"/>
+            <a:endParaRPr lang="en-CA" dirty="0"/>
           </a:p>
         </p:txBody>
       </p:sp>
@@ -349,7 +352,7 @@
             </a:lvl1pPr>
           </a:lstStyle>
           <a:p>
-            <a:endParaRPr lang="en-CA"/>
+            <a:endParaRPr lang="en-CA" dirty="0"/>
           </a:p>
         </p:txBody>
       </p:sp>
@@ -384,7 +387,7 @@
               <a:rPr lang="en-CA" smtClean="0"/>
               <a:t>‹#›</a:t>
             </a:fld>
-            <a:endParaRPr lang="en-CA"/>
+            <a:endParaRPr lang="en-CA" dirty="0"/>
           </a:p>
         </p:txBody>
       </p:sp>
@@ -594,7 +597,7 @@
               <a:rPr lang="en-CA" smtClean="0"/>
               <a:t>4</a:t>
             </a:fld>
-            <a:endParaRPr lang="en-CA"/>
+            <a:endParaRPr lang="en-CA" dirty="0"/>
           </a:p>
         </p:txBody>
       </p:sp>
@@ -714,7 +717,7 @@
               <a:rPr lang="en-CA" smtClean="0"/>
               <a:t>5</a:t>
             </a:fld>
-            <a:endParaRPr lang="en-CA"/>
+            <a:endParaRPr lang="en-CA" dirty="0"/>
           </a:p>
         </p:txBody>
       </p:sp>
@@ -851,15 +854,7 @@
             </a:pPr>
             <a:r>
               <a:rPr lang="en-CA" baseline="0" dirty="0" smtClean="0"/>
-              <a:t>We assume these risk reduction rates will be comparable to proposed </a:t>
-            </a:r>
-            <a:r>
-              <a:rPr lang="en-CA" baseline="0" dirty="0" err="1" smtClean="0"/>
-              <a:t>mpox</a:t>
-            </a:r>
-            <a:r>
-              <a:rPr lang="en-CA" baseline="0" dirty="0" smtClean="0"/>
-              <a:t> interventions</a:t>
+              <a:t>We assume these risk reduction rates will be comparable to proposed mpox interventions</a:t>
             </a:r>
           </a:p>
           <a:p>
@@ -868,12 +863,8 @@
               <a:buChar char="•"/>
             </a:pPr>
             <a:r>
-              <a:rPr lang="en-CA" baseline="0" dirty="0" err="1" smtClean="0"/>
-              <a:t>Mpox</a:t>
-            </a:r>
-            <a:r>
               <a:rPr lang="en-CA" baseline="0" dirty="0" smtClean="0"/>
-              <a:t> isn’t necessarily only sexually transmitted</a:t>
+              <a:t>Mpox isn’t necessarily only sexually transmitted</a:t>
             </a:r>
           </a:p>
           <a:p>
@@ -914,7 +905,7 @@
               <a:rPr lang="en-CA" smtClean="0"/>
               <a:t>6</a:t>
             </a:fld>
-            <a:endParaRPr lang="en-CA"/>
+            <a:endParaRPr lang="en-CA" dirty="0"/>
           </a:p>
         </p:txBody>
       </p:sp>
@@ -1021,7 +1012,7 @@
               <a:rPr lang="en-CA" smtClean="0"/>
               <a:t>7</a:t>
             </a:fld>
-            <a:endParaRPr lang="en-CA"/>
+            <a:endParaRPr lang="en-CA" dirty="0"/>
           </a:p>
         </p:txBody>
       </p:sp>
@@ -1105,7 +1096,7 @@
               <a:rPr lang="en-CA" smtClean="0"/>
               <a:t>11</a:t>
             </a:fld>
-            <a:endParaRPr lang="en-CA"/>
+            <a:endParaRPr lang="en-CA" dirty="0"/>
           </a:p>
         </p:txBody>
       </p:sp>
@@ -1113,6 +1104,342 @@
     <p:extLst>
       <p:ext uri="{BB962C8B-B14F-4D97-AF65-F5344CB8AC3E}">
         <p14:creationId xmlns:p14="http://schemas.microsoft.com/office/powerpoint/2010/main" val="3233464869"/>
+      </p:ext>
+    </p:extLst>
+  </p:cSld>
+  <p:clrMapOvr>
+    <a:masterClrMapping/>
+  </p:clrMapOvr>
+</p:notes>
+</file>
+
+<file path=ppt/notesSlides/notesSlide6.xml><?xml version="1.0" encoding="utf-8"?>
+<p:notes xmlns:a="http://schemas.openxmlformats.org/drawingml/2006/main" xmlns:r="http://schemas.openxmlformats.org/officeDocument/2006/relationships" xmlns:p="http://schemas.openxmlformats.org/presentationml/2006/main">
+  <p:cSld>
+    <p:spTree>
+      <p:nvGrpSpPr>
+        <p:cNvPr id="1" name=""/>
+        <p:cNvGrpSpPr/>
+        <p:nvPr/>
+      </p:nvGrpSpPr>
+      <p:grpSpPr>
+        <a:xfrm>
+          <a:off x="0" y="0"/>
+          <a:ext cx="0" cy="0"/>
+          <a:chOff x="0" y="0"/>
+          <a:chExt cx="0" cy="0"/>
+        </a:xfrm>
+      </p:grpSpPr>
+      <p:sp>
+        <p:nvSpPr>
+          <p:cNvPr id="2" name="Slide Image Placeholder 1"/>
+          <p:cNvSpPr>
+            <a:spLocks noGrp="1" noRot="1" noChangeAspect="1"/>
+          </p:cNvSpPr>
+          <p:nvPr>
+            <p:ph type="sldImg"/>
+          </p:nvPr>
+        </p:nvSpPr>
+        <p:spPr/>
+      </p:sp>
+      <p:sp>
+        <p:nvSpPr>
+          <p:cNvPr id="3" name="Notes Placeholder 2"/>
+          <p:cNvSpPr>
+            <a:spLocks noGrp="1"/>
+          </p:cNvSpPr>
+          <p:nvPr>
+            <p:ph type="body" idx="1"/>
+          </p:nvPr>
+        </p:nvSpPr>
+        <p:spPr/>
+        <p:txBody>
+          <a:bodyPr/>
+          <a:lstStyle/>
+          <a:p>
+            <a:endParaRPr lang="en-CA" dirty="0"/>
+          </a:p>
+        </p:txBody>
+      </p:sp>
+      <p:sp>
+        <p:nvSpPr>
+          <p:cNvPr id="4" name="Slide Number Placeholder 3"/>
+          <p:cNvSpPr>
+            <a:spLocks noGrp="1"/>
+          </p:cNvSpPr>
+          <p:nvPr>
+            <p:ph type="sldNum" sz="quarter" idx="10"/>
+          </p:nvPr>
+        </p:nvSpPr>
+        <p:spPr/>
+        <p:txBody>
+          <a:bodyPr/>
+          <a:lstStyle/>
+          <a:p>
+            <a:fld id="{D0FB26DE-DCE0-4EDF-B98B-E266198E2DA6}" type="slidenum">
+              <a:rPr lang="en-CA" smtClean="0"/>
+              <a:t>16</a:t>
+            </a:fld>
+            <a:endParaRPr lang="en-CA" dirty="0"/>
+          </a:p>
+        </p:txBody>
+      </p:sp>
+    </p:spTree>
+    <p:extLst>
+      <p:ext uri="{BB962C8B-B14F-4D97-AF65-F5344CB8AC3E}">
+        <p14:creationId xmlns:p14="http://schemas.microsoft.com/office/powerpoint/2010/main" val="1469818186"/>
+      </p:ext>
+    </p:extLst>
+  </p:cSld>
+  <p:clrMapOvr>
+    <a:masterClrMapping/>
+  </p:clrMapOvr>
+</p:notes>
+</file>
+
+<file path=ppt/notesSlides/notesSlide7.xml><?xml version="1.0" encoding="utf-8"?>
+<p:notes xmlns:a="http://schemas.openxmlformats.org/drawingml/2006/main" xmlns:r="http://schemas.openxmlformats.org/officeDocument/2006/relationships" xmlns:p="http://schemas.openxmlformats.org/presentationml/2006/main">
+  <p:cSld>
+    <p:spTree>
+      <p:nvGrpSpPr>
+        <p:cNvPr id="1" name=""/>
+        <p:cNvGrpSpPr/>
+        <p:nvPr/>
+      </p:nvGrpSpPr>
+      <p:grpSpPr>
+        <a:xfrm>
+          <a:off x="0" y="0"/>
+          <a:ext cx="0" cy="0"/>
+          <a:chOff x="0" y="0"/>
+          <a:chExt cx="0" cy="0"/>
+        </a:xfrm>
+      </p:grpSpPr>
+      <p:sp>
+        <p:nvSpPr>
+          <p:cNvPr id="2" name="Slide Image Placeholder 1"/>
+          <p:cNvSpPr>
+            <a:spLocks noGrp="1" noRot="1" noChangeAspect="1"/>
+          </p:cNvSpPr>
+          <p:nvPr>
+            <p:ph type="sldImg"/>
+          </p:nvPr>
+        </p:nvSpPr>
+        <p:spPr/>
+      </p:sp>
+      <p:sp>
+        <p:nvSpPr>
+          <p:cNvPr id="3" name="Notes Placeholder 2"/>
+          <p:cNvSpPr>
+            <a:spLocks noGrp="1"/>
+          </p:cNvSpPr>
+          <p:nvPr>
+            <p:ph type="body" idx="1"/>
+          </p:nvPr>
+        </p:nvSpPr>
+        <p:spPr/>
+        <p:txBody>
+          <a:bodyPr/>
+          <a:lstStyle/>
+          <a:p>
+            <a:endParaRPr lang="en-CA" dirty="0"/>
+          </a:p>
+        </p:txBody>
+      </p:sp>
+      <p:sp>
+        <p:nvSpPr>
+          <p:cNvPr id="4" name="Slide Number Placeholder 3"/>
+          <p:cNvSpPr>
+            <a:spLocks noGrp="1"/>
+          </p:cNvSpPr>
+          <p:nvPr>
+            <p:ph type="sldNum" sz="quarter" idx="10"/>
+          </p:nvPr>
+        </p:nvSpPr>
+        <p:spPr/>
+        <p:txBody>
+          <a:bodyPr/>
+          <a:lstStyle/>
+          <a:p>
+            <a:fld id="{D0FB26DE-DCE0-4EDF-B98B-E266198E2DA6}" type="slidenum">
+              <a:rPr lang="en-CA" smtClean="0"/>
+              <a:t>17</a:t>
+            </a:fld>
+            <a:endParaRPr lang="en-CA" dirty="0"/>
+          </a:p>
+        </p:txBody>
+      </p:sp>
+    </p:spTree>
+    <p:extLst>
+      <p:ext uri="{BB962C8B-B14F-4D97-AF65-F5344CB8AC3E}">
+        <p14:creationId xmlns:p14="http://schemas.microsoft.com/office/powerpoint/2010/main" val="1469818186"/>
+      </p:ext>
+    </p:extLst>
+  </p:cSld>
+  <p:clrMapOvr>
+    <a:masterClrMapping/>
+  </p:clrMapOvr>
+</p:notes>
+</file>
+
+<file path=ppt/notesSlides/notesSlide8.xml><?xml version="1.0" encoding="utf-8"?>
+<p:notes xmlns:a="http://schemas.openxmlformats.org/drawingml/2006/main" xmlns:r="http://schemas.openxmlformats.org/officeDocument/2006/relationships" xmlns:p="http://schemas.openxmlformats.org/presentationml/2006/main">
+  <p:cSld>
+    <p:spTree>
+      <p:nvGrpSpPr>
+        <p:cNvPr id="1" name=""/>
+        <p:cNvGrpSpPr/>
+        <p:nvPr/>
+      </p:nvGrpSpPr>
+      <p:grpSpPr>
+        <a:xfrm>
+          <a:off x="0" y="0"/>
+          <a:ext cx="0" cy="0"/>
+          <a:chOff x="0" y="0"/>
+          <a:chExt cx="0" cy="0"/>
+        </a:xfrm>
+      </p:grpSpPr>
+      <p:sp>
+        <p:nvSpPr>
+          <p:cNvPr id="2" name="Slide Image Placeholder 1"/>
+          <p:cNvSpPr>
+            <a:spLocks noGrp="1" noRot="1" noChangeAspect="1"/>
+          </p:cNvSpPr>
+          <p:nvPr>
+            <p:ph type="sldImg"/>
+          </p:nvPr>
+        </p:nvSpPr>
+        <p:spPr/>
+      </p:sp>
+      <p:sp>
+        <p:nvSpPr>
+          <p:cNvPr id="3" name="Notes Placeholder 2"/>
+          <p:cNvSpPr>
+            <a:spLocks noGrp="1"/>
+          </p:cNvSpPr>
+          <p:nvPr>
+            <p:ph type="body" idx="1"/>
+          </p:nvPr>
+        </p:nvSpPr>
+        <p:spPr/>
+        <p:txBody>
+          <a:bodyPr/>
+          <a:lstStyle/>
+          <a:p>
+            <a:endParaRPr lang="en-CA" dirty="0"/>
+          </a:p>
+        </p:txBody>
+      </p:sp>
+      <p:sp>
+        <p:nvSpPr>
+          <p:cNvPr id="4" name="Slide Number Placeholder 3"/>
+          <p:cNvSpPr>
+            <a:spLocks noGrp="1"/>
+          </p:cNvSpPr>
+          <p:nvPr>
+            <p:ph type="sldNum" sz="quarter" idx="10"/>
+          </p:nvPr>
+        </p:nvSpPr>
+        <p:spPr/>
+        <p:txBody>
+          <a:bodyPr/>
+          <a:lstStyle/>
+          <a:p>
+            <a:fld id="{D0FB26DE-DCE0-4EDF-B98B-E266198E2DA6}" type="slidenum">
+              <a:rPr lang="en-CA" smtClean="0"/>
+              <a:t>18</a:t>
+            </a:fld>
+            <a:endParaRPr lang="en-CA" dirty="0"/>
+          </a:p>
+        </p:txBody>
+      </p:sp>
+    </p:spTree>
+    <p:extLst>
+      <p:ext uri="{BB962C8B-B14F-4D97-AF65-F5344CB8AC3E}">
+        <p14:creationId xmlns:p14="http://schemas.microsoft.com/office/powerpoint/2010/main" val="1469818186"/>
+      </p:ext>
+    </p:extLst>
+  </p:cSld>
+  <p:clrMapOvr>
+    <a:masterClrMapping/>
+  </p:clrMapOvr>
+</p:notes>
+</file>
+
+<file path=ppt/notesSlides/notesSlide9.xml><?xml version="1.0" encoding="utf-8"?>
+<p:notes xmlns:a="http://schemas.openxmlformats.org/drawingml/2006/main" xmlns:r="http://schemas.openxmlformats.org/officeDocument/2006/relationships" xmlns:p="http://schemas.openxmlformats.org/presentationml/2006/main">
+  <p:cSld>
+    <p:spTree>
+      <p:nvGrpSpPr>
+        <p:cNvPr id="1" name=""/>
+        <p:cNvGrpSpPr/>
+        <p:nvPr/>
+      </p:nvGrpSpPr>
+      <p:grpSpPr>
+        <a:xfrm>
+          <a:off x="0" y="0"/>
+          <a:ext cx="0" cy="0"/>
+          <a:chOff x="0" y="0"/>
+          <a:chExt cx="0" cy="0"/>
+        </a:xfrm>
+      </p:grpSpPr>
+      <p:sp>
+        <p:nvSpPr>
+          <p:cNvPr id="2" name="Slide Image Placeholder 1"/>
+          <p:cNvSpPr>
+            <a:spLocks noGrp="1" noRot="1" noChangeAspect="1"/>
+          </p:cNvSpPr>
+          <p:nvPr>
+            <p:ph type="sldImg"/>
+          </p:nvPr>
+        </p:nvSpPr>
+        <p:spPr/>
+      </p:sp>
+      <p:sp>
+        <p:nvSpPr>
+          <p:cNvPr id="3" name="Notes Placeholder 2"/>
+          <p:cNvSpPr>
+            <a:spLocks noGrp="1"/>
+          </p:cNvSpPr>
+          <p:nvPr>
+            <p:ph type="body" idx="1"/>
+          </p:nvPr>
+        </p:nvSpPr>
+        <p:spPr/>
+        <p:txBody>
+          <a:bodyPr/>
+          <a:lstStyle/>
+          <a:p>
+            <a:endParaRPr lang="en-CA" dirty="0"/>
+          </a:p>
+        </p:txBody>
+      </p:sp>
+      <p:sp>
+        <p:nvSpPr>
+          <p:cNvPr id="4" name="Slide Number Placeholder 3"/>
+          <p:cNvSpPr>
+            <a:spLocks noGrp="1"/>
+          </p:cNvSpPr>
+          <p:nvPr>
+            <p:ph type="sldNum" sz="quarter" idx="10"/>
+          </p:nvPr>
+        </p:nvSpPr>
+        <p:spPr/>
+        <p:txBody>
+          <a:bodyPr/>
+          <a:lstStyle/>
+          <a:p>
+            <a:fld id="{D0FB26DE-DCE0-4EDF-B98B-E266198E2DA6}" type="slidenum">
+              <a:rPr lang="en-CA" smtClean="0"/>
+              <a:t>19</a:t>
+            </a:fld>
+            <a:endParaRPr lang="en-CA" dirty="0"/>
+          </a:p>
+        </p:txBody>
+      </p:sp>
+    </p:spTree>
+    <p:extLst>
+      <p:ext uri="{BB962C8B-B14F-4D97-AF65-F5344CB8AC3E}">
+        <p14:creationId xmlns:p14="http://schemas.microsoft.com/office/powerpoint/2010/main" val="1469818186"/>
       </p:ext>
     </p:extLst>
   </p:cSld>
@@ -1193,7 +1520,7 @@
           <a:bodyPr wrap="square" lIns="0" tIns="0" rIns="0" bIns="0" rtlCol="0"/>
           <a:lstStyle/>
           <a:p>
-            <a:endParaRPr/>
+            <a:endParaRPr dirty="0"/>
           </a:p>
         </p:txBody>
       </p:sp>
@@ -1243,7 +1570,7 @@
           <a:bodyPr wrap="square" lIns="0" tIns="0" rIns="0" bIns="0" rtlCol="0"/>
           <a:lstStyle/>
           <a:p>
-            <a:endParaRPr/>
+            <a:endParaRPr dirty="0"/>
           </a:p>
         </p:txBody>
       </p:sp>
@@ -1386,7 +1713,7 @@
             </a:lvl1pPr>
           </a:lstStyle>
           <a:p>
-            <a:endParaRPr/>
+            <a:endParaRPr dirty="0"/>
           </a:p>
         </p:txBody>
       </p:sp>
@@ -1419,7 +1746,7 @@
               <a:rPr lang="en-US"/>
               <a:t>4/5/2023</a:t>
             </a:fld>
-            <a:endParaRPr lang="en-US"/>
+            <a:endParaRPr lang="en-US" dirty="0"/>
           </a:p>
         </p:txBody>
       </p:sp>
@@ -1566,7 +1893,7 @@
             </a:lvl1pPr>
           </a:lstStyle>
           <a:p>
-            <a:endParaRPr/>
+            <a:endParaRPr dirty="0"/>
           </a:p>
         </p:txBody>
       </p:sp>
@@ -1599,7 +1926,7 @@
               <a:rPr lang="en-US"/>
               <a:t>4/5/2023</a:t>
             </a:fld>
-            <a:endParaRPr lang="en-US"/>
+            <a:endParaRPr lang="en-US" dirty="0"/>
           </a:p>
         </p:txBody>
       </p:sp>
@@ -1789,7 +2116,7 @@
             </a:lvl1pPr>
           </a:lstStyle>
           <a:p>
-            <a:endParaRPr/>
+            <a:endParaRPr dirty="0"/>
           </a:p>
         </p:txBody>
       </p:sp>
@@ -1822,7 +2149,7 @@
               <a:rPr lang="en-US"/>
               <a:t>4/5/2023</a:t>
             </a:fld>
-            <a:endParaRPr lang="en-US"/>
+            <a:endParaRPr lang="en-US" dirty="0"/>
           </a:p>
         </p:txBody>
       </p:sp>
@@ -1946,7 +2273,7 @@
             </a:lvl1pPr>
           </a:lstStyle>
           <a:p>
-            <a:endParaRPr/>
+            <a:endParaRPr dirty="0"/>
           </a:p>
         </p:txBody>
       </p:sp>
@@ -1979,7 +2306,7 @@
               <a:rPr lang="en-US"/>
               <a:t>4/5/2023</a:t>
             </a:fld>
-            <a:endParaRPr lang="en-US"/>
+            <a:endParaRPr lang="en-US" dirty="0"/>
           </a:p>
         </p:txBody>
       </p:sp>
@@ -2103,7 +2430,7 @@
           <a:bodyPr wrap="square" lIns="0" tIns="0" rIns="0" bIns="0" rtlCol="0"/>
           <a:lstStyle/>
           <a:p>
-            <a:endParaRPr/>
+            <a:endParaRPr dirty="0"/>
           </a:p>
         </p:txBody>
       </p:sp>
@@ -2132,7 +2459,7 @@
             </a:lvl1pPr>
           </a:lstStyle>
           <a:p>
-            <a:endParaRPr/>
+            <a:endParaRPr dirty="0"/>
           </a:p>
         </p:txBody>
       </p:sp>
@@ -2165,7 +2492,7 @@
               <a:rPr lang="en-US"/>
               <a:t>4/5/2023</a:t>
             </a:fld>
-            <a:endParaRPr lang="en-US"/>
+            <a:endParaRPr lang="en-US" dirty="0"/>
           </a:p>
         </p:txBody>
       </p:sp>
@@ -2289,7 +2616,7 @@
           <a:bodyPr wrap="square" lIns="0" tIns="0" rIns="0" bIns="0" rtlCol="0"/>
           <a:lstStyle/>
           <a:p>
-            <a:endParaRPr/>
+            <a:endParaRPr dirty="0"/>
           </a:p>
         </p:txBody>
       </p:sp>
@@ -2400,7 +2727,7 @@
             </a:lvl1pPr>
           </a:lstStyle>
           <a:p>
-            <a:endParaRPr/>
+            <a:endParaRPr dirty="0"/>
           </a:p>
         </p:txBody>
       </p:sp>
@@ -2443,7 +2770,7 @@
               <a:rPr lang="en-US"/>
               <a:t>4/5/2023</a:t>
             </a:fld>
-            <a:endParaRPr lang="en-US"/>
+            <a:endParaRPr lang="en-US" dirty="0"/>
           </a:p>
         </p:txBody>
       </p:sp>
@@ -2793,14 +3120,44 @@
               </a:spcBef>
             </a:pPr>
             <a:r>
-              <a:rPr lang="en-CA" sz="1200" b="1" spc="-10" dirty="0" err="1">
+              <a:rPr lang="en-CA" sz="1200" b="1" spc="-10" dirty="0">
                 <a:solidFill>
                   <a:srgbClr val="F1CD00"/>
                 </a:solidFill>
                 <a:latin typeface="Roboto"/>
                 <a:cs typeface="Roboto"/>
               </a:rPr>
-              <a:t>Hedieh</a:t>
+              <a:t>Hedieh </a:t>
+            </a:r>
+            <a:r>
+              <a:rPr lang="en-CA" sz="1200" b="1" spc="-10" dirty="0" smtClean="0">
+                <a:solidFill>
+                  <a:srgbClr val="F1CD00"/>
+                </a:solidFill>
+                <a:latin typeface="Roboto"/>
+                <a:cs typeface="Roboto"/>
+              </a:rPr>
+              <a:t>Kalachahi</a:t>
+            </a:r>
+          </a:p>
+          <a:p>
+            <a:pPr marL="12700" marR="5080">
+              <a:lnSpc>
+                <a:spcPct val="100000"/>
+              </a:lnSpc>
+              <a:spcBef>
+                <a:spcPts val="100"/>
+              </a:spcBef>
+            </a:pPr>
+            <a:r>
+              <a:rPr lang="en-CA" sz="1200" b="1" spc="-10" dirty="0" smtClean="0">
+                <a:solidFill>
+                  <a:srgbClr val="F1CD00"/>
+                </a:solidFill>
+                <a:latin typeface="Roboto"/>
+                <a:cs typeface="Roboto"/>
+              </a:rPr>
+              <a:t>Saira</a:t>
             </a:r>
             <a:r>
               <a:rPr lang="en-CA" sz="1200" b="1" spc="-10" dirty="0">
@@ -2813,54 +3170,7 @@
               <a:t> </a:t>
             </a:r>
             <a:r>
-              <a:rPr lang="en-CA" sz="1200" b="1" spc="-10" dirty="0" err="1" smtClean="0">
-                <a:solidFill>
-                  <a:srgbClr val="F1CD00"/>
-                </a:solidFill>
-                <a:latin typeface="Roboto"/>
-                <a:cs typeface="Roboto"/>
-              </a:rPr>
-              <a:t>Kalachahi</a:t>
-            </a:r>
-            <a:endParaRPr lang="en-CA" sz="1200" b="1" spc="-10" dirty="0" smtClean="0">
-              <a:solidFill>
-                <a:srgbClr val="F1CD00"/>
-              </a:solidFill>
-              <a:latin typeface="Roboto"/>
-              <a:cs typeface="Roboto"/>
-            </a:endParaRPr>
-          </a:p>
-          <a:p>
-            <a:pPr marL="12700" marR="5080">
-              <a:lnSpc>
-                <a:spcPct val="100000"/>
-              </a:lnSpc>
-              <a:spcBef>
-                <a:spcPts val="100"/>
-              </a:spcBef>
-            </a:pPr>
-            <a:r>
-              <a:rPr lang="en-CA" sz="1200" b="1" spc="-10" dirty="0" err="1" smtClean="0">
-                <a:solidFill>
-                  <a:srgbClr val="F1CD00"/>
-                </a:solidFill>
-                <a:latin typeface="Roboto"/>
-                <a:cs typeface="Roboto"/>
-              </a:rPr>
-              <a:t>Saira</a:t>
-            </a:r>
-            <a:r>
-              <a:rPr lang="en-CA" sz="1200" b="1" spc="-10" dirty="0">
-                <a:solidFill>
-                  <a:srgbClr val="F1CD00"/>
-                </a:solidFill>
-                <a:latin typeface="Roboto"/>
-                <a:cs typeface="Roboto"/>
-              </a:rPr>
-              <a:t> </a:t>
-            </a:r>
-            <a:r>
-              <a:rPr lang="en-CA" sz="1200" b="1" spc="-10" dirty="0" err="1" smtClean="0">
+              <a:rPr lang="en-CA" sz="1200" b="1" spc="-10" dirty="0" smtClean="0">
                 <a:solidFill>
                   <a:srgbClr val="F1CD00"/>
                 </a:solidFill>
@@ -2869,13 +3179,6 @@
               </a:rPr>
               <a:t>Faiz</a:t>
             </a:r>
-            <a:endParaRPr lang="en-CA" sz="1200" b="1" spc="-10" dirty="0" smtClean="0">
-              <a:solidFill>
-                <a:srgbClr val="F1CD00"/>
-              </a:solidFill>
-              <a:latin typeface="Roboto"/>
-              <a:cs typeface="Roboto"/>
-            </a:endParaRPr>
           </a:p>
           <a:p>
             <a:pPr marL="12700" marR="5080">
@@ -3044,15 +3347,7 @@
             </a:pPr>
             <a:r>
               <a:rPr lang="en-CA" dirty="0" smtClean="0"/>
-              <a:t>Add how sensitive education rate (alpha - # of people educated per day) and education effectiveness (</a:t>
-            </a:r>
-            <a:r>
-              <a:rPr lang="en-CA" dirty="0" err="1" smtClean="0"/>
-              <a:t>beta_e</a:t>
-            </a:r>
-            <a:r>
-              <a:rPr lang="en-CA" dirty="0" smtClean="0"/>
-              <a:t>) on total cumulative infected.</a:t>
+              <a:t>Add how sensitive education rate (alpha - # of people educated per day) and education effectiveness (beta_e) on total cumulative infected.</a:t>
             </a:r>
           </a:p>
         </p:txBody>
@@ -3488,7 +3783,7 @@
         </p:nvSpPr>
         <p:spPr>
           <a:xfrm>
-            <a:off x="758663" y="2647950"/>
+            <a:off x="838200" y="1352550"/>
             <a:ext cx="7620000" cy="1200329"/>
           </a:xfrm>
           <a:prstGeom prst="rect">
@@ -3770,7 +4065,7 @@
           <a:bodyPr wrap="square" lIns="0" tIns="0" rIns="0" bIns="0" rtlCol="0"/>
           <a:lstStyle/>
           <a:p>
-            <a:endParaRPr/>
+            <a:endParaRPr dirty="0"/>
           </a:p>
         </p:txBody>
       </p:sp>
@@ -3911,7 +4206,7 @@
         <p:spPr>
           <a:xfrm>
             <a:off x="331250" y="250726"/>
-            <a:ext cx="4621750" cy="597599"/>
+            <a:ext cx="8660350" cy="597599"/>
           </a:xfrm>
           <a:prstGeom prst="rect">
             <a:avLst/>
@@ -3937,7 +4232,7 @@
                   <a:srgbClr val="F1CD00"/>
                 </a:solidFill>
               </a:rPr>
-              <a:t>Technical Appendix</a:t>
+              <a:t>Appendix A: Mathematical Model</a:t>
             </a:r>
             <a:endParaRPr sz="3800" dirty="0"/>
           </a:p>
@@ -3982,14 +4277,1176 @@
       </p:sp>
       <p:sp>
         <p:nvSpPr>
+          <p:cNvPr id="3" name="Rounded Rectangle 2"/>
+          <p:cNvSpPr/>
+          <p:nvPr/>
+        </p:nvSpPr>
+        <p:spPr>
+          <a:xfrm>
+            <a:off x="685800" y="1200150"/>
+            <a:ext cx="1080000" cy="1080000"/>
+          </a:xfrm>
+          <a:prstGeom prst="roundRect">
+            <a:avLst/>
+          </a:prstGeom>
+          <a:noFill/>
+          <a:ln>
+            <a:solidFill>
+              <a:schemeClr val="tx1"/>
+            </a:solidFill>
+          </a:ln>
+        </p:spPr>
+        <p:style>
+          <a:lnRef idx="2">
+            <a:schemeClr val="accent1">
+              <a:shade val="50000"/>
+            </a:schemeClr>
+          </a:lnRef>
+          <a:fillRef idx="1">
+            <a:schemeClr val="accent1"/>
+          </a:fillRef>
+          <a:effectRef idx="0">
+            <a:schemeClr val="accent1"/>
+          </a:effectRef>
+          <a:fontRef idx="minor">
+            <a:schemeClr val="lt1"/>
+          </a:fontRef>
+        </p:style>
+        <p:txBody>
+          <a:bodyPr rtlCol="0" anchor="ctr"/>
+          <a:lstStyle/>
+          <a:p>
+            <a:pPr algn="ctr"/>
+            <a:r>
+              <a:rPr lang="en-CA" sz="8800" dirty="0" smtClean="0">
+                <a:solidFill>
+                  <a:schemeClr val="tx1"/>
+                </a:solidFill>
+              </a:rPr>
+              <a:t>S</a:t>
+            </a:r>
+            <a:endParaRPr lang="en-CA" sz="8800" dirty="0">
+              <a:solidFill>
+                <a:schemeClr val="tx1"/>
+              </a:solidFill>
+            </a:endParaRPr>
+          </a:p>
+        </p:txBody>
+      </p:sp>
+      <p:sp>
+        <p:nvSpPr>
+          <p:cNvPr id="6" name="Rounded Rectangle 5"/>
+          <p:cNvSpPr/>
+          <p:nvPr/>
+        </p:nvSpPr>
+        <p:spPr>
+          <a:xfrm>
+            <a:off x="4800600" y="3199491"/>
+            <a:ext cx="1080000" cy="1080000"/>
+          </a:xfrm>
+          <a:prstGeom prst="roundRect">
+            <a:avLst/>
+          </a:prstGeom>
+          <a:noFill/>
+          <a:ln>
+            <a:solidFill>
+              <a:schemeClr val="tx1"/>
+            </a:solidFill>
+          </a:ln>
+        </p:spPr>
+        <p:style>
+          <a:lnRef idx="2">
+            <a:schemeClr val="accent1">
+              <a:shade val="50000"/>
+            </a:schemeClr>
+          </a:lnRef>
+          <a:fillRef idx="1">
+            <a:schemeClr val="accent1"/>
+          </a:fillRef>
+          <a:effectRef idx="0">
+            <a:schemeClr val="accent1"/>
+          </a:effectRef>
+          <a:fontRef idx="minor">
+            <a:schemeClr val="lt1"/>
+          </a:fontRef>
+        </p:style>
+        <p:txBody>
+          <a:bodyPr rtlCol="0" anchor="ctr"/>
+          <a:lstStyle/>
+          <a:p>
+            <a:pPr algn="ctr"/>
+            <a:r>
+              <a:rPr lang="en-CA" sz="8800" dirty="0" smtClean="0">
+                <a:solidFill>
+                  <a:schemeClr val="tx1"/>
+                </a:solidFill>
+              </a:rPr>
+              <a:t>I</a:t>
+            </a:r>
+            <a:r>
+              <a:rPr lang="en-CA" sz="4000" baseline="-25000" dirty="0" smtClean="0">
+                <a:solidFill>
+                  <a:schemeClr val="tx1"/>
+                </a:solidFill>
+              </a:rPr>
+              <a:t>e</a:t>
+            </a:r>
+            <a:endParaRPr lang="en-CA" sz="8800" baseline="-25000" dirty="0">
+              <a:solidFill>
+                <a:schemeClr val="tx1"/>
+              </a:solidFill>
+            </a:endParaRPr>
+          </a:p>
+        </p:txBody>
+      </p:sp>
+      <p:sp>
+        <p:nvSpPr>
+          <p:cNvPr id="8" name="Rounded Rectangle 7"/>
+          <p:cNvSpPr/>
+          <p:nvPr/>
+        </p:nvSpPr>
+        <p:spPr>
+          <a:xfrm>
+            <a:off x="2743756" y="3199491"/>
+            <a:ext cx="1080000" cy="1080000"/>
+          </a:xfrm>
+          <a:prstGeom prst="roundRect">
+            <a:avLst/>
+          </a:prstGeom>
+          <a:noFill/>
+          <a:ln>
+            <a:solidFill>
+              <a:schemeClr val="tx1"/>
+            </a:solidFill>
+          </a:ln>
+        </p:spPr>
+        <p:style>
+          <a:lnRef idx="2">
+            <a:schemeClr val="accent1">
+              <a:shade val="50000"/>
+            </a:schemeClr>
+          </a:lnRef>
+          <a:fillRef idx="1">
+            <a:schemeClr val="accent1"/>
+          </a:fillRef>
+          <a:effectRef idx="0">
+            <a:schemeClr val="accent1"/>
+          </a:effectRef>
+          <a:fontRef idx="minor">
+            <a:schemeClr val="lt1"/>
+          </a:fontRef>
+        </p:style>
+        <p:txBody>
+          <a:bodyPr rtlCol="0" anchor="ctr"/>
+          <a:lstStyle/>
+          <a:p>
+            <a:pPr algn="ctr"/>
+            <a:r>
+              <a:rPr lang="en-CA" sz="8800" dirty="0" smtClean="0">
+                <a:solidFill>
+                  <a:schemeClr val="tx1"/>
+                </a:solidFill>
+              </a:rPr>
+              <a:t>E</a:t>
+            </a:r>
+            <a:r>
+              <a:rPr lang="en-CA" sz="4000" baseline="-25000" dirty="0" smtClean="0">
+                <a:solidFill>
+                  <a:schemeClr val="tx1"/>
+                </a:solidFill>
+              </a:rPr>
+              <a:t>e</a:t>
+            </a:r>
+            <a:endParaRPr lang="en-CA" sz="8800" baseline="-25000" dirty="0">
+              <a:solidFill>
+                <a:schemeClr val="tx1"/>
+              </a:solidFill>
+            </a:endParaRPr>
+          </a:p>
+        </p:txBody>
+      </p:sp>
+      <p:sp>
+        <p:nvSpPr>
+          <p:cNvPr id="9" name="Rounded Rectangle 8"/>
+          <p:cNvSpPr/>
+          <p:nvPr/>
+        </p:nvSpPr>
+        <p:spPr>
+          <a:xfrm>
+            <a:off x="685800" y="3199491"/>
+            <a:ext cx="1080000" cy="1080000"/>
+          </a:xfrm>
+          <a:prstGeom prst="roundRect">
+            <a:avLst/>
+          </a:prstGeom>
+          <a:noFill/>
+          <a:ln>
+            <a:solidFill>
+              <a:schemeClr val="tx1"/>
+            </a:solidFill>
+          </a:ln>
+        </p:spPr>
+        <p:style>
+          <a:lnRef idx="2">
+            <a:schemeClr val="accent1">
+              <a:shade val="50000"/>
+            </a:schemeClr>
+          </a:lnRef>
+          <a:fillRef idx="1">
+            <a:schemeClr val="accent1"/>
+          </a:fillRef>
+          <a:effectRef idx="0">
+            <a:schemeClr val="accent1"/>
+          </a:effectRef>
+          <a:fontRef idx="minor">
+            <a:schemeClr val="lt1"/>
+          </a:fontRef>
+        </p:style>
+        <p:txBody>
+          <a:bodyPr rtlCol="0" anchor="ctr"/>
+          <a:lstStyle/>
+          <a:p>
+            <a:pPr algn="ctr"/>
+            <a:r>
+              <a:rPr lang="en-CA" sz="8800" dirty="0" smtClean="0">
+                <a:solidFill>
+                  <a:schemeClr val="tx1"/>
+                </a:solidFill>
+              </a:rPr>
+              <a:t>S</a:t>
+            </a:r>
+            <a:r>
+              <a:rPr lang="en-CA" sz="4000" baseline="-25000" dirty="0" smtClean="0">
+                <a:solidFill>
+                  <a:schemeClr val="tx1"/>
+                </a:solidFill>
+              </a:rPr>
+              <a:t>e</a:t>
+            </a:r>
+            <a:endParaRPr lang="en-CA" sz="4000" baseline="-25000" dirty="0">
+              <a:solidFill>
+                <a:schemeClr val="tx1"/>
+              </a:solidFill>
+            </a:endParaRPr>
+          </a:p>
+        </p:txBody>
+      </p:sp>
+      <p:sp>
+        <p:nvSpPr>
+          <p:cNvPr id="10" name="Rounded Rectangle 9"/>
+          <p:cNvSpPr/>
+          <p:nvPr/>
+        </p:nvSpPr>
+        <p:spPr>
+          <a:xfrm>
+            <a:off x="2743200" y="1200150"/>
+            <a:ext cx="1080000" cy="1080000"/>
+          </a:xfrm>
+          <a:prstGeom prst="roundRect">
+            <a:avLst/>
+          </a:prstGeom>
+          <a:noFill/>
+          <a:ln>
+            <a:solidFill>
+              <a:schemeClr val="tx1"/>
+            </a:solidFill>
+          </a:ln>
+        </p:spPr>
+        <p:style>
+          <a:lnRef idx="2">
+            <a:schemeClr val="accent1">
+              <a:shade val="50000"/>
+            </a:schemeClr>
+          </a:lnRef>
+          <a:fillRef idx="1">
+            <a:schemeClr val="accent1"/>
+          </a:fillRef>
+          <a:effectRef idx="0">
+            <a:schemeClr val="accent1"/>
+          </a:effectRef>
+          <a:fontRef idx="minor">
+            <a:schemeClr val="lt1"/>
+          </a:fontRef>
+        </p:style>
+        <p:txBody>
+          <a:bodyPr rtlCol="0" anchor="ctr"/>
+          <a:lstStyle/>
+          <a:p>
+            <a:pPr algn="ctr"/>
+            <a:r>
+              <a:rPr lang="en-CA" sz="8800" dirty="0">
+                <a:solidFill>
+                  <a:schemeClr val="tx1"/>
+                </a:solidFill>
+              </a:rPr>
+              <a:t>E</a:t>
+            </a:r>
+          </a:p>
+        </p:txBody>
+      </p:sp>
+      <p:sp>
+        <p:nvSpPr>
+          <p:cNvPr id="11" name="Rounded Rectangle 10"/>
+          <p:cNvSpPr/>
+          <p:nvPr/>
+        </p:nvSpPr>
+        <p:spPr>
+          <a:xfrm>
+            <a:off x="4800600" y="1200150"/>
+            <a:ext cx="1080000" cy="1080000"/>
+          </a:xfrm>
+          <a:prstGeom prst="roundRect">
+            <a:avLst/>
+          </a:prstGeom>
+          <a:noFill/>
+          <a:ln>
+            <a:solidFill>
+              <a:schemeClr val="tx1"/>
+            </a:solidFill>
+          </a:ln>
+        </p:spPr>
+        <p:style>
+          <a:lnRef idx="2">
+            <a:schemeClr val="accent1">
+              <a:shade val="50000"/>
+            </a:schemeClr>
+          </a:lnRef>
+          <a:fillRef idx="1">
+            <a:schemeClr val="accent1"/>
+          </a:fillRef>
+          <a:effectRef idx="0">
+            <a:schemeClr val="accent1"/>
+          </a:effectRef>
+          <a:fontRef idx="minor">
+            <a:schemeClr val="lt1"/>
+          </a:fontRef>
+        </p:style>
+        <p:txBody>
+          <a:bodyPr rtlCol="0" anchor="ctr"/>
+          <a:lstStyle/>
+          <a:p>
+            <a:pPr algn="ctr"/>
+            <a:r>
+              <a:rPr lang="en-CA" sz="8800" dirty="0">
+                <a:solidFill>
+                  <a:schemeClr val="tx1"/>
+                </a:solidFill>
+              </a:rPr>
+              <a:t>I</a:t>
+            </a:r>
+          </a:p>
+        </p:txBody>
+      </p:sp>
+      <p:sp>
+        <p:nvSpPr>
+          <p:cNvPr id="12" name="Rounded Rectangle 11"/>
+          <p:cNvSpPr/>
+          <p:nvPr/>
+        </p:nvSpPr>
+        <p:spPr>
+          <a:xfrm>
+            <a:off x="6858000" y="1200150"/>
+            <a:ext cx="1080000" cy="1080000"/>
+          </a:xfrm>
+          <a:prstGeom prst="roundRect">
+            <a:avLst/>
+          </a:prstGeom>
+          <a:noFill/>
+          <a:ln>
+            <a:solidFill>
+              <a:schemeClr val="tx1"/>
+            </a:solidFill>
+          </a:ln>
+        </p:spPr>
+        <p:style>
+          <a:lnRef idx="2">
+            <a:schemeClr val="accent1">
+              <a:shade val="50000"/>
+            </a:schemeClr>
+          </a:lnRef>
+          <a:fillRef idx="1">
+            <a:schemeClr val="accent1"/>
+          </a:fillRef>
+          <a:effectRef idx="0">
+            <a:schemeClr val="accent1"/>
+          </a:effectRef>
+          <a:fontRef idx="minor">
+            <a:schemeClr val="lt1"/>
+          </a:fontRef>
+        </p:style>
+        <p:txBody>
+          <a:bodyPr rtlCol="0" anchor="ctr"/>
+          <a:lstStyle/>
+          <a:p>
+            <a:pPr algn="ctr"/>
+            <a:r>
+              <a:rPr lang="en-CA" sz="8800" dirty="0">
+                <a:solidFill>
+                  <a:schemeClr val="tx1"/>
+                </a:solidFill>
+              </a:rPr>
+              <a:t>R</a:t>
+            </a:r>
+          </a:p>
+        </p:txBody>
+      </p:sp>
+      <p:cxnSp>
+        <p:nvCxnSpPr>
+          <p:cNvPr id="13" name="Straight Arrow Connector 12"/>
+          <p:cNvCxnSpPr>
+            <a:stCxn id="3" idx="3"/>
+            <a:endCxn id="10" idx="1"/>
+          </p:cNvCxnSpPr>
+          <p:nvPr/>
+        </p:nvCxnSpPr>
+        <p:spPr>
+          <a:xfrm>
+            <a:off x="1765800" y="1740150"/>
+            <a:ext cx="977400" cy="0"/>
+          </a:xfrm>
+          <a:prstGeom prst="straightConnector1">
+            <a:avLst/>
+          </a:prstGeom>
+          <a:ln>
+            <a:tailEnd type="arrow"/>
+          </a:ln>
+        </p:spPr>
+        <p:style>
+          <a:lnRef idx="1">
+            <a:schemeClr val="dk1"/>
+          </a:lnRef>
+          <a:fillRef idx="0">
+            <a:schemeClr val="dk1"/>
+          </a:fillRef>
+          <a:effectRef idx="0">
+            <a:schemeClr val="dk1"/>
+          </a:effectRef>
+          <a:fontRef idx="minor">
+            <a:schemeClr val="tx1"/>
+          </a:fontRef>
+        </p:style>
+      </p:cxnSp>
+      <p:cxnSp>
+        <p:nvCxnSpPr>
+          <p:cNvPr id="14" name="Straight Arrow Connector 13"/>
+          <p:cNvCxnSpPr>
+            <a:stCxn id="11" idx="2"/>
+            <a:endCxn id="6" idx="0"/>
+          </p:cNvCxnSpPr>
+          <p:nvPr/>
+        </p:nvCxnSpPr>
+        <p:spPr>
+          <a:xfrm>
+            <a:off x="5340600" y="2280150"/>
+            <a:ext cx="0" cy="919341"/>
+          </a:xfrm>
+          <a:prstGeom prst="straightConnector1">
+            <a:avLst/>
+          </a:prstGeom>
+          <a:ln>
+            <a:tailEnd type="arrow"/>
+          </a:ln>
+        </p:spPr>
+        <p:style>
+          <a:lnRef idx="1">
+            <a:schemeClr val="dk1"/>
+          </a:lnRef>
+          <a:fillRef idx="0">
+            <a:schemeClr val="dk1"/>
+          </a:fillRef>
+          <a:effectRef idx="0">
+            <a:schemeClr val="dk1"/>
+          </a:effectRef>
+          <a:fontRef idx="minor">
+            <a:schemeClr val="tx1"/>
+          </a:fontRef>
+        </p:style>
+      </p:cxnSp>
+      <p:cxnSp>
+        <p:nvCxnSpPr>
+          <p:cNvPr id="15" name="Straight Arrow Connector 14"/>
+          <p:cNvCxnSpPr>
+            <a:stCxn id="10" idx="2"/>
+            <a:endCxn id="8" idx="0"/>
+          </p:cNvCxnSpPr>
+          <p:nvPr/>
+        </p:nvCxnSpPr>
+        <p:spPr>
+          <a:xfrm>
+            <a:off x="3283200" y="2280150"/>
+            <a:ext cx="556" cy="919341"/>
+          </a:xfrm>
+          <a:prstGeom prst="straightConnector1">
+            <a:avLst/>
+          </a:prstGeom>
+          <a:ln>
+            <a:tailEnd type="arrow"/>
+          </a:ln>
+        </p:spPr>
+        <p:style>
+          <a:lnRef idx="1">
+            <a:schemeClr val="dk1"/>
+          </a:lnRef>
+          <a:fillRef idx="0">
+            <a:schemeClr val="dk1"/>
+          </a:fillRef>
+          <a:effectRef idx="0">
+            <a:schemeClr val="dk1"/>
+          </a:effectRef>
+          <a:fontRef idx="minor">
+            <a:schemeClr val="tx1"/>
+          </a:fontRef>
+        </p:style>
+      </p:cxnSp>
+      <p:cxnSp>
+        <p:nvCxnSpPr>
+          <p:cNvPr id="16" name="Straight Arrow Connector 15"/>
+          <p:cNvCxnSpPr>
+            <a:stCxn id="3" idx="2"/>
+            <a:endCxn id="9" idx="0"/>
+          </p:cNvCxnSpPr>
+          <p:nvPr/>
+        </p:nvCxnSpPr>
+        <p:spPr>
+          <a:xfrm>
+            <a:off x="1225800" y="2280150"/>
+            <a:ext cx="0" cy="919341"/>
+          </a:xfrm>
+          <a:prstGeom prst="straightConnector1">
+            <a:avLst/>
+          </a:prstGeom>
+          <a:ln>
+            <a:tailEnd type="arrow"/>
+          </a:ln>
+        </p:spPr>
+        <p:style>
+          <a:lnRef idx="1">
+            <a:schemeClr val="dk1"/>
+          </a:lnRef>
+          <a:fillRef idx="0">
+            <a:schemeClr val="dk1"/>
+          </a:fillRef>
+          <a:effectRef idx="0">
+            <a:schemeClr val="dk1"/>
+          </a:effectRef>
+          <a:fontRef idx="minor">
+            <a:schemeClr val="tx1"/>
+          </a:fontRef>
+        </p:style>
+      </p:cxnSp>
+      <p:cxnSp>
+        <p:nvCxnSpPr>
+          <p:cNvPr id="17" name="Straight Arrow Connector 16"/>
+          <p:cNvCxnSpPr/>
+          <p:nvPr/>
+        </p:nvCxnSpPr>
+        <p:spPr>
+          <a:xfrm>
+            <a:off x="3823200" y="3728710"/>
+            <a:ext cx="977400" cy="0"/>
+          </a:xfrm>
+          <a:prstGeom prst="straightConnector1">
+            <a:avLst/>
+          </a:prstGeom>
+          <a:ln>
+            <a:tailEnd type="arrow"/>
+          </a:ln>
+        </p:spPr>
+        <p:style>
+          <a:lnRef idx="1">
+            <a:schemeClr val="dk1"/>
+          </a:lnRef>
+          <a:fillRef idx="0">
+            <a:schemeClr val="dk1"/>
+          </a:fillRef>
+          <a:effectRef idx="0">
+            <a:schemeClr val="dk1"/>
+          </a:effectRef>
+          <a:fontRef idx="minor">
+            <a:schemeClr val="tx1"/>
+          </a:fontRef>
+        </p:style>
+      </p:cxnSp>
+      <p:cxnSp>
+        <p:nvCxnSpPr>
+          <p:cNvPr id="18" name="Straight Arrow Connector 17"/>
+          <p:cNvCxnSpPr/>
+          <p:nvPr/>
+        </p:nvCxnSpPr>
+        <p:spPr>
+          <a:xfrm>
+            <a:off x="1765800" y="3739491"/>
+            <a:ext cx="977400" cy="0"/>
+          </a:xfrm>
+          <a:prstGeom prst="straightConnector1">
+            <a:avLst/>
+          </a:prstGeom>
+          <a:ln>
+            <a:tailEnd type="arrow"/>
+          </a:ln>
+        </p:spPr>
+        <p:style>
+          <a:lnRef idx="1">
+            <a:schemeClr val="dk1"/>
+          </a:lnRef>
+          <a:fillRef idx="0">
+            <a:schemeClr val="dk1"/>
+          </a:fillRef>
+          <a:effectRef idx="0">
+            <a:schemeClr val="dk1"/>
+          </a:effectRef>
+          <a:fontRef idx="minor">
+            <a:schemeClr val="tx1"/>
+          </a:fontRef>
+        </p:style>
+      </p:cxnSp>
+      <p:cxnSp>
+        <p:nvCxnSpPr>
+          <p:cNvPr id="19" name="Straight Arrow Connector 18"/>
+          <p:cNvCxnSpPr/>
+          <p:nvPr/>
+        </p:nvCxnSpPr>
+        <p:spPr>
+          <a:xfrm>
+            <a:off x="3823200" y="1794519"/>
+            <a:ext cx="977400" cy="0"/>
+          </a:xfrm>
+          <a:prstGeom prst="straightConnector1">
+            <a:avLst/>
+          </a:prstGeom>
+          <a:ln>
+            <a:tailEnd type="arrow"/>
+          </a:ln>
+        </p:spPr>
+        <p:style>
+          <a:lnRef idx="1">
+            <a:schemeClr val="dk1"/>
+          </a:lnRef>
+          <a:fillRef idx="0">
+            <a:schemeClr val="dk1"/>
+          </a:fillRef>
+          <a:effectRef idx="0">
+            <a:schemeClr val="dk1"/>
+          </a:effectRef>
+          <a:fontRef idx="minor">
+            <a:schemeClr val="tx1"/>
+          </a:fontRef>
+        </p:style>
+      </p:cxnSp>
+      <p:cxnSp>
+        <p:nvCxnSpPr>
+          <p:cNvPr id="20" name="Straight Arrow Connector 19"/>
+          <p:cNvCxnSpPr/>
+          <p:nvPr/>
+        </p:nvCxnSpPr>
+        <p:spPr>
+          <a:xfrm>
+            <a:off x="5880600" y="1809750"/>
+            <a:ext cx="977400" cy="0"/>
+          </a:xfrm>
+          <a:prstGeom prst="straightConnector1">
+            <a:avLst/>
+          </a:prstGeom>
+          <a:ln>
+            <a:tailEnd type="arrow"/>
+          </a:ln>
+        </p:spPr>
+        <p:style>
+          <a:lnRef idx="1">
+            <a:schemeClr val="dk1"/>
+          </a:lnRef>
+          <a:fillRef idx="0">
+            <a:schemeClr val="dk1"/>
+          </a:fillRef>
+          <a:effectRef idx="0">
+            <a:schemeClr val="dk1"/>
+          </a:effectRef>
+          <a:fontRef idx="minor">
+            <a:schemeClr val="tx1"/>
+          </a:fontRef>
+        </p:style>
+      </p:cxnSp>
+      <p:cxnSp>
+        <p:nvCxnSpPr>
+          <p:cNvPr id="21" name="Straight Arrow Connector 20"/>
+          <p:cNvCxnSpPr>
+            <a:endCxn id="12" idx="2"/>
+          </p:cNvCxnSpPr>
+          <p:nvPr/>
+        </p:nvCxnSpPr>
+        <p:spPr>
+          <a:xfrm flipV="1">
+            <a:off x="5880600" y="2280150"/>
+            <a:ext cx="1517400" cy="1448560"/>
+          </a:xfrm>
+          <a:prstGeom prst="straightConnector1">
+            <a:avLst/>
+          </a:prstGeom>
+          <a:ln>
+            <a:tailEnd type="arrow"/>
+          </a:ln>
+        </p:spPr>
+        <p:style>
+          <a:lnRef idx="1">
+            <a:schemeClr val="dk1"/>
+          </a:lnRef>
+          <a:fillRef idx="0">
+            <a:schemeClr val="dk1"/>
+          </a:fillRef>
+          <a:effectRef idx="0">
+            <a:schemeClr val="dk1"/>
+          </a:effectRef>
+          <a:fontRef idx="minor">
+            <a:schemeClr val="tx1"/>
+          </a:fontRef>
+        </p:style>
+      </p:cxnSp>
+      <p:sp>
+        <p:nvSpPr>
+          <p:cNvPr id="29" name="TextBox 28"/>
+          <p:cNvSpPr txBox="1"/>
+          <p:nvPr/>
+        </p:nvSpPr>
+        <p:spPr>
+          <a:xfrm>
+            <a:off x="2057400" y="1504950"/>
+            <a:ext cx="381000" cy="276999"/>
+          </a:xfrm>
+          <a:prstGeom prst="rect">
+            <a:avLst/>
+          </a:prstGeom>
+          <a:noFill/>
+        </p:spPr>
+        <p:txBody>
+          <a:bodyPr wrap="square" rtlCol="0">
+            <a:spAutoFit/>
+          </a:bodyPr>
+          <a:lstStyle/>
+          <a:p>
+            <a:r>
+              <a:rPr lang="el-GR" sz="1200" dirty="0" smtClean="0"/>
+              <a:t>β</a:t>
+            </a:r>
+            <a:r>
+              <a:rPr lang="en-CA" sz="1200" dirty="0" smtClean="0"/>
+              <a:t>SI</a:t>
+            </a:r>
+            <a:endParaRPr lang="en-CA" sz="1200" dirty="0"/>
+          </a:p>
+        </p:txBody>
+      </p:sp>
+      <p:sp>
+        <p:nvSpPr>
+          <p:cNvPr id="30" name="TextBox 29"/>
+          <p:cNvSpPr txBox="1"/>
+          <p:nvPr/>
+        </p:nvSpPr>
+        <p:spPr>
+          <a:xfrm>
+            <a:off x="1295400" y="2601320"/>
+            <a:ext cx="381000" cy="276999"/>
+          </a:xfrm>
+          <a:prstGeom prst="rect">
+            <a:avLst/>
+          </a:prstGeom>
+          <a:noFill/>
+        </p:spPr>
+        <p:txBody>
+          <a:bodyPr wrap="square" rtlCol="0">
+            <a:spAutoFit/>
+          </a:bodyPr>
+          <a:lstStyle/>
+          <a:p>
+            <a:r>
+              <a:rPr lang="el-GR" sz="1200" dirty="0" smtClean="0"/>
+              <a:t>α</a:t>
+            </a:r>
+            <a:r>
+              <a:rPr lang="en-CA" sz="1200" dirty="0" smtClean="0"/>
+              <a:t>S</a:t>
+            </a:r>
+            <a:endParaRPr lang="en-CA" sz="1200" dirty="0"/>
+          </a:p>
+        </p:txBody>
+      </p:sp>
+      <p:sp>
+        <p:nvSpPr>
+          <p:cNvPr id="31" name="TextBox 30"/>
+          <p:cNvSpPr txBox="1"/>
+          <p:nvPr/>
+        </p:nvSpPr>
+        <p:spPr>
+          <a:xfrm>
+            <a:off x="2819400" y="2629121"/>
+            <a:ext cx="381000" cy="276999"/>
+          </a:xfrm>
+          <a:prstGeom prst="rect">
+            <a:avLst/>
+          </a:prstGeom>
+          <a:noFill/>
+        </p:spPr>
+        <p:txBody>
+          <a:bodyPr wrap="square" rtlCol="0">
+            <a:spAutoFit/>
+          </a:bodyPr>
+          <a:lstStyle/>
+          <a:p>
+            <a:r>
+              <a:rPr lang="el-GR" sz="1200" dirty="0" smtClean="0"/>
+              <a:t>α</a:t>
+            </a:r>
+            <a:r>
+              <a:rPr lang="en-CA" sz="1200" dirty="0"/>
+              <a:t>E</a:t>
+            </a:r>
+          </a:p>
+        </p:txBody>
+      </p:sp>
+      <p:sp>
+        <p:nvSpPr>
+          <p:cNvPr id="32" name="TextBox 31"/>
+          <p:cNvSpPr txBox="1"/>
+          <p:nvPr/>
+        </p:nvSpPr>
+        <p:spPr>
+          <a:xfrm>
+            <a:off x="4926228" y="2629121"/>
+            <a:ext cx="381000" cy="276999"/>
+          </a:xfrm>
+          <a:prstGeom prst="rect">
+            <a:avLst/>
+          </a:prstGeom>
+          <a:noFill/>
+        </p:spPr>
+        <p:txBody>
+          <a:bodyPr wrap="square" rtlCol="0">
+            <a:spAutoFit/>
+          </a:bodyPr>
+          <a:lstStyle/>
+          <a:p>
+            <a:r>
+              <a:rPr lang="el-GR" sz="1200" dirty="0" smtClean="0"/>
+              <a:t>α</a:t>
+            </a:r>
+            <a:r>
+              <a:rPr lang="en-CA" sz="1200" dirty="0"/>
+              <a:t>I</a:t>
+            </a:r>
+          </a:p>
+        </p:txBody>
+      </p:sp>
+      <p:sp>
+        <p:nvSpPr>
+          <p:cNvPr id="33" name="TextBox 32"/>
+          <p:cNvSpPr txBox="1"/>
+          <p:nvPr/>
+        </p:nvSpPr>
+        <p:spPr>
+          <a:xfrm>
+            <a:off x="4121400" y="1517520"/>
+            <a:ext cx="381000" cy="276999"/>
+          </a:xfrm>
+          <a:prstGeom prst="rect">
+            <a:avLst/>
+          </a:prstGeom>
+          <a:noFill/>
+        </p:spPr>
+        <p:txBody>
+          <a:bodyPr wrap="square" rtlCol="0">
+            <a:spAutoFit/>
+          </a:bodyPr>
+          <a:lstStyle/>
+          <a:p>
+            <a:r>
+              <a:rPr lang="el-GR" sz="1200" dirty="0" smtClean="0"/>
+              <a:t>σ</a:t>
+            </a:r>
+            <a:r>
+              <a:rPr lang="en-CA" sz="1200" dirty="0" smtClean="0"/>
+              <a:t>E</a:t>
+            </a:r>
+            <a:endParaRPr lang="en-CA" sz="1200" dirty="0"/>
+          </a:p>
+        </p:txBody>
+      </p:sp>
+      <p:sp>
+        <p:nvSpPr>
+          <p:cNvPr id="34" name="TextBox 33"/>
+          <p:cNvSpPr txBox="1"/>
+          <p:nvPr/>
+        </p:nvSpPr>
+        <p:spPr>
+          <a:xfrm>
+            <a:off x="6178800" y="1502672"/>
+            <a:ext cx="381000" cy="276999"/>
+          </a:xfrm>
+          <a:prstGeom prst="rect">
+            <a:avLst/>
+          </a:prstGeom>
+          <a:noFill/>
+        </p:spPr>
+        <p:txBody>
+          <a:bodyPr wrap="square" rtlCol="0">
+            <a:spAutoFit/>
+          </a:bodyPr>
+          <a:lstStyle/>
+          <a:p>
+            <a:r>
+              <a:rPr lang="el-GR" sz="1200" dirty="0"/>
+              <a:t>γ</a:t>
+            </a:r>
+            <a:r>
+              <a:rPr lang="en-CA" sz="1200" dirty="0" smtClean="0"/>
+              <a:t>I</a:t>
+            </a:r>
+            <a:endParaRPr lang="en-CA" sz="1200" dirty="0"/>
+          </a:p>
+        </p:txBody>
+      </p:sp>
+      <p:sp>
+        <p:nvSpPr>
+          <p:cNvPr id="35" name="TextBox 34"/>
+          <p:cNvSpPr txBox="1"/>
+          <p:nvPr/>
+        </p:nvSpPr>
+        <p:spPr>
+          <a:xfrm>
+            <a:off x="4112944" y="3451711"/>
+            <a:ext cx="459055" cy="276999"/>
+          </a:xfrm>
+          <a:prstGeom prst="rect">
+            <a:avLst/>
+          </a:prstGeom>
+          <a:noFill/>
+        </p:spPr>
+        <p:txBody>
+          <a:bodyPr wrap="square" rtlCol="0">
+            <a:spAutoFit/>
+          </a:bodyPr>
+          <a:lstStyle/>
+          <a:p>
+            <a:r>
+              <a:rPr lang="el-GR" sz="1200" dirty="0" smtClean="0"/>
+              <a:t>σ</a:t>
+            </a:r>
+            <a:r>
+              <a:rPr lang="en-CA" sz="1200" dirty="0"/>
+              <a:t>E</a:t>
+            </a:r>
+            <a:r>
+              <a:rPr lang="en-CA" sz="1200" baseline="-25000" dirty="0" smtClean="0"/>
+              <a:t>e</a:t>
+            </a:r>
+            <a:endParaRPr lang="en-CA" sz="1200" baseline="-25000" dirty="0"/>
+          </a:p>
+        </p:txBody>
+      </p:sp>
+      <p:sp>
+        <p:nvSpPr>
+          <p:cNvPr id="36" name="TextBox 35"/>
+          <p:cNvSpPr txBox="1"/>
+          <p:nvPr/>
+        </p:nvSpPr>
+        <p:spPr>
+          <a:xfrm>
+            <a:off x="6276099" y="2769250"/>
+            <a:ext cx="381000" cy="276999"/>
+          </a:xfrm>
+          <a:prstGeom prst="rect">
+            <a:avLst/>
+          </a:prstGeom>
+          <a:noFill/>
+        </p:spPr>
+        <p:txBody>
+          <a:bodyPr wrap="square" rtlCol="0">
+            <a:spAutoFit/>
+          </a:bodyPr>
+          <a:lstStyle/>
+          <a:p>
+            <a:r>
+              <a:rPr lang="el-GR" sz="1200" dirty="0"/>
+              <a:t>γ</a:t>
+            </a:r>
+            <a:r>
+              <a:rPr lang="en-CA" sz="1200" dirty="0" smtClean="0"/>
+              <a:t>I</a:t>
+            </a:r>
+            <a:r>
+              <a:rPr lang="en-CA" sz="1200" baseline="-25000" dirty="0" smtClean="0"/>
+              <a:t>e</a:t>
+            </a:r>
+            <a:endParaRPr lang="en-CA" sz="1200" baseline="-25000" dirty="0"/>
+          </a:p>
+        </p:txBody>
+      </p:sp>
+      <p:sp>
+        <p:nvSpPr>
+          <p:cNvPr id="37" name="TextBox 36"/>
+          <p:cNvSpPr txBox="1"/>
+          <p:nvPr/>
+        </p:nvSpPr>
+        <p:spPr>
+          <a:xfrm>
+            <a:off x="1975452" y="3465611"/>
+            <a:ext cx="615348" cy="276999"/>
+          </a:xfrm>
+          <a:prstGeom prst="rect">
+            <a:avLst/>
+          </a:prstGeom>
+          <a:noFill/>
+        </p:spPr>
+        <p:txBody>
+          <a:bodyPr wrap="square" rtlCol="0">
+            <a:spAutoFit/>
+          </a:bodyPr>
+          <a:lstStyle/>
+          <a:p>
+            <a:r>
+              <a:rPr lang="el-GR" sz="1200" dirty="0" smtClean="0"/>
+              <a:t>β</a:t>
+            </a:r>
+            <a:r>
+              <a:rPr lang="en-CA" sz="1200" baseline="-25000" dirty="0" smtClean="0"/>
+              <a:t>e</a:t>
+            </a:r>
+            <a:r>
+              <a:rPr lang="en-CA" sz="1200" dirty="0" smtClean="0"/>
+              <a:t>E</a:t>
+            </a:r>
+            <a:r>
+              <a:rPr lang="en-CA" sz="1200" baseline="-25000" dirty="0" smtClean="0"/>
+              <a:t>e</a:t>
+            </a:r>
+            <a:r>
+              <a:rPr lang="en-CA" sz="1200" dirty="0" smtClean="0"/>
+              <a:t>I</a:t>
+            </a:r>
+            <a:endParaRPr lang="en-CA" sz="1200" baseline="-25000" dirty="0"/>
+          </a:p>
+        </p:txBody>
+      </p:sp>
+    </p:spTree>
+    <p:extLst>
+      <p:ext uri="{BB962C8B-B14F-4D97-AF65-F5344CB8AC3E}">
+        <p14:creationId xmlns:p14="http://schemas.microsoft.com/office/powerpoint/2010/main" val="1297351768"/>
+      </p:ext>
+    </p:extLst>
+  </p:cSld>
+  <p:clrMapOvr>
+    <a:masterClrMapping/>
+  </p:clrMapOvr>
+</p:sld>
+</file>
+
+<file path=ppt/slides/slide17.xml><?xml version="1.0" encoding="utf-8"?>
+<p:sld xmlns:a="http://schemas.openxmlformats.org/drawingml/2006/main" xmlns:r="http://schemas.openxmlformats.org/officeDocument/2006/relationships" xmlns:p="http://schemas.openxmlformats.org/presentationml/2006/main">
+  <p:cSld>
+    <p:spTree>
+      <p:nvGrpSpPr>
+        <p:cNvPr id="1" name=""/>
+        <p:cNvGrpSpPr/>
+        <p:nvPr/>
+      </p:nvGrpSpPr>
+      <p:grpSpPr>
+        <a:xfrm>
+          <a:off x="0" y="0"/>
+          <a:ext cx="0" cy="0"/>
+          <a:chOff x="0" y="0"/>
+          <a:chExt cx="0" cy="0"/>
+        </a:xfrm>
+      </p:grpSpPr>
+      <p:sp>
+        <p:nvSpPr>
+          <p:cNvPr id="2" name="object 2"/>
+          <p:cNvSpPr txBox="1">
+            <a:spLocks noGrp="1"/>
+          </p:cNvSpPr>
+          <p:nvPr>
+            <p:ph type="title"/>
+          </p:nvPr>
+        </p:nvSpPr>
+        <p:spPr>
+          <a:xfrm>
+            <a:off x="331250" y="250726"/>
+            <a:ext cx="8812750" cy="597599"/>
+          </a:xfrm>
+          <a:prstGeom prst="rect">
+            <a:avLst/>
+          </a:prstGeom>
+        </p:spPr>
+        <p:txBody>
+          <a:bodyPr vert="horz" wrap="square" lIns="0" tIns="12700" rIns="0" bIns="0" rtlCol="0">
+            <a:spAutoFit/>
+          </a:bodyPr>
+          <a:lstStyle/>
+          <a:p>
+            <a:pPr marL="12700">
+              <a:lnSpc>
+                <a:spcPct val="100000"/>
+              </a:lnSpc>
+              <a:spcBef>
+                <a:spcPts val="100"/>
+              </a:spcBef>
+            </a:pPr>
+            <a:r>
+              <a:rPr lang="en-CA" sz="3800" spc="-35" dirty="0" smtClean="0">
+                <a:solidFill>
+                  <a:srgbClr val="F1CD00"/>
+                </a:solidFill>
+              </a:rPr>
+              <a:t>Appendix B: Variables and Parameters</a:t>
+            </a:r>
+            <a:endParaRPr sz="3800" dirty="0"/>
+          </a:p>
+        </p:txBody>
+      </p:sp>
+      <p:sp>
+        <p:nvSpPr>
+          <p:cNvPr id="7" name="object 7"/>
+          <p:cNvSpPr txBox="1">
+            <a:spLocks noGrp="1"/>
+          </p:cNvSpPr>
+          <p:nvPr>
+            <p:ph type="sldNum" sz="quarter" idx="7"/>
+          </p:nvPr>
+        </p:nvSpPr>
+        <p:spPr>
+          <a:prstGeom prst="rect">
+            <a:avLst/>
+          </a:prstGeom>
+        </p:spPr>
+        <p:txBody>
+          <a:bodyPr vert="horz" wrap="square" lIns="0" tIns="635" rIns="0" bIns="0" rtlCol="0">
+            <a:spAutoFit/>
+          </a:bodyPr>
+          <a:lstStyle/>
+          <a:p>
+            <a:pPr marL="38100">
+              <a:lnSpc>
+                <a:spcPct val="100000"/>
+              </a:lnSpc>
+              <a:spcBef>
+                <a:spcPts val="5"/>
+              </a:spcBef>
+            </a:pPr>
+            <a:fld id="{81D60167-4931-47E6-BA6A-407CBD079E47}" type="slidenum">
+              <a:rPr dirty="0"/>
+              <a:t>17</a:t>
+            </a:fld>
+            <a:endParaRPr dirty="0"/>
+          </a:p>
+        </p:txBody>
+      </p:sp>
+      <p:sp>
+        <p:nvSpPr>
           <p:cNvPr id="4" name="TextBox 3"/>
           <p:cNvSpPr txBox="1"/>
           <p:nvPr/>
         </p:nvSpPr>
         <p:spPr>
           <a:xfrm>
-            <a:off x="762000" y="1352550"/>
-            <a:ext cx="7620000" cy="1200329"/>
+            <a:off x="421603" y="1200150"/>
+            <a:ext cx="8153400" cy="3231654"/>
           </a:xfrm>
           <a:prstGeom prst="rect">
             <a:avLst/>
@@ -4003,51 +5460,714 @@
           <a:lstStyle/>
           <a:p>
             <a:r>
-              <a:rPr lang="en-CA" dirty="0" smtClean="0"/>
-              <a:t>To do:</a:t>
-            </a:r>
-          </a:p>
-          <a:p>
-            <a:pPr marL="285750" indent="-285750">
-              <a:buFont typeface="Arial" panose="020B0604020202020204" pitchFamily="34" charset="0"/>
-              <a:buChar char="•"/>
-            </a:pPr>
-            <a:r>
-              <a:rPr lang="en-CA" dirty="0" smtClean="0"/>
-              <a:t>Add any data or charts that are more technical in case we are asked about </a:t>
-            </a:r>
-            <a:r>
-              <a:rPr lang="en-CA" dirty="0" smtClean="0"/>
-              <a:t>it</a:t>
-            </a:r>
-          </a:p>
-          <a:p>
-            <a:pPr marL="285750" indent="-285750">
-              <a:buFont typeface="Arial" panose="020B0604020202020204" pitchFamily="34" charset="0"/>
-              <a:buChar char="•"/>
-            </a:pPr>
-            <a:r>
-              <a:rPr lang="en-CA" dirty="0" smtClean="0"/>
-              <a:t>Could include code</a:t>
-            </a:r>
-            <a:endParaRPr lang="en-CA" dirty="0" smtClean="0"/>
-          </a:p>
-          <a:p>
-            <a:pPr marL="285750" indent="-285750">
-              <a:buFont typeface="Arial" panose="020B0604020202020204" pitchFamily="34" charset="0"/>
-              <a:buChar char="•"/>
-            </a:pPr>
-            <a:r>
-              <a:rPr lang="en-CA" dirty="0" smtClean="0"/>
-              <a:t>Could include stability analysis</a:t>
-            </a:r>
+              <a:rPr lang="en-CA" sz="1200" dirty="0" smtClean="0"/>
+              <a:t>Population variables:</a:t>
+            </a:r>
+          </a:p>
+          <a:p>
+            <a:r>
+              <a:rPr lang="en-CA" sz="1200" dirty="0" smtClean="0"/>
+              <a:t>S – susceptible</a:t>
+            </a:r>
+          </a:p>
+          <a:p>
+            <a:r>
+              <a:rPr lang="en-CA" sz="1200" dirty="0" smtClean="0"/>
+              <a:t>S</a:t>
+            </a:r>
+            <a:r>
+              <a:rPr lang="en-CA" sz="1200" baseline="-25000" dirty="0" smtClean="0"/>
+              <a:t>e</a:t>
+            </a:r>
+            <a:r>
+              <a:rPr lang="en-CA" sz="1200" dirty="0" smtClean="0"/>
+              <a:t> – susceptible population that received educational intervention</a:t>
+            </a:r>
+            <a:endParaRPr lang="en-CA" sz="1200" baseline="-25000" dirty="0" smtClean="0"/>
+          </a:p>
+          <a:p>
+            <a:r>
+              <a:rPr lang="en-CA" sz="1200" dirty="0" smtClean="0"/>
+              <a:t>E – exposed</a:t>
+            </a:r>
+          </a:p>
+          <a:p>
+            <a:r>
+              <a:rPr lang="en-CA" sz="1200" dirty="0" smtClean="0"/>
+              <a:t>E</a:t>
+            </a:r>
+            <a:r>
+              <a:rPr lang="en-CA" sz="1200" baseline="-25000" dirty="0" smtClean="0"/>
+              <a:t>e </a:t>
+            </a:r>
+            <a:r>
+              <a:rPr lang="en-CA" sz="1200" dirty="0" smtClean="0"/>
+              <a:t>– exposed population that received educational intervention</a:t>
+            </a:r>
+          </a:p>
+          <a:p>
+            <a:r>
+              <a:rPr lang="en-CA" sz="1200" dirty="0" smtClean="0"/>
+              <a:t>I – Infected</a:t>
+            </a:r>
+          </a:p>
+          <a:p>
+            <a:r>
+              <a:rPr lang="en-CA" sz="1200" dirty="0" smtClean="0"/>
+              <a:t>I</a:t>
+            </a:r>
+            <a:r>
+              <a:rPr lang="en-CA" sz="1200" baseline="-25000" dirty="0" smtClean="0"/>
+              <a:t>e </a:t>
+            </a:r>
+            <a:r>
+              <a:rPr lang="en-CA" sz="1200" dirty="0"/>
+              <a:t>– </a:t>
+            </a:r>
+            <a:r>
+              <a:rPr lang="en-CA" sz="1200" dirty="0" smtClean="0"/>
+              <a:t>infected </a:t>
+            </a:r>
+            <a:r>
+              <a:rPr lang="en-CA" sz="1200" dirty="0"/>
+              <a:t>population that received educational </a:t>
+            </a:r>
+            <a:r>
+              <a:rPr lang="en-CA" sz="1200" dirty="0" smtClean="0"/>
+              <a:t>intervention</a:t>
+            </a:r>
+          </a:p>
+          <a:p>
+            <a:endParaRPr lang="en-CA" sz="1200" dirty="0"/>
+          </a:p>
+          <a:p>
+            <a:r>
+              <a:rPr lang="en-CA" sz="1200" dirty="0" smtClean="0"/>
+              <a:t>Parameters:</a:t>
+            </a:r>
+          </a:p>
+          <a:p>
+            <a:r>
+              <a:rPr lang="el-GR" sz="1200" dirty="0" smtClean="0"/>
+              <a:t>β</a:t>
+            </a:r>
+            <a:r>
+              <a:rPr lang="en-CA" sz="1200" dirty="0" smtClean="0"/>
+              <a:t> – infectious rate for susceptible population</a:t>
+            </a:r>
+          </a:p>
+          <a:p>
+            <a:r>
+              <a:rPr lang="el-GR" sz="1200" dirty="0" smtClean="0"/>
+              <a:t>β</a:t>
+            </a:r>
+            <a:r>
+              <a:rPr lang="en-CA" sz="1200" baseline="-25000" dirty="0" smtClean="0"/>
+              <a:t>e</a:t>
+            </a:r>
+            <a:r>
+              <a:rPr lang="en-CA" sz="1200" dirty="0" smtClean="0"/>
+              <a:t> </a:t>
+            </a:r>
+            <a:r>
+              <a:rPr lang="en-CA" sz="1200" dirty="0"/>
+              <a:t>– infectious rate for susceptible </a:t>
+            </a:r>
+            <a:r>
+              <a:rPr lang="en-CA" sz="1200" dirty="0" smtClean="0"/>
+              <a:t>population that received educational intervention</a:t>
+            </a:r>
+          </a:p>
+          <a:p>
+            <a:r>
+              <a:rPr lang="en-CA" sz="1200" dirty="0" smtClean="0"/>
+              <a:t>σ – exposed to infected rate</a:t>
+            </a:r>
+          </a:p>
+          <a:p>
+            <a:r>
+              <a:rPr lang="en-CA" sz="1200" dirty="0" smtClean="0"/>
+              <a:t>γ – recovery rate</a:t>
+            </a:r>
+          </a:p>
+          <a:p>
+            <a:r>
+              <a:rPr lang="en-CA" sz="1200" dirty="0" smtClean="0"/>
+              <a:t>α – education rate</a:t>
+            </a:r>
+          </a:p>
+          <a:p>
+            <a:endParaRPr lang="en-CA" sz="1200" dirty="0"/>
+          </a:p>
+          <a:p>
+            <a:endParaRPr lang="en-CA" sz="1200" dirty="0"/>
+          </a:p>
+          <a:p>
+            <a:endParaRPr lang="en-CA" sz="1200" dirty="0"/>
           </a:p>
         </p:txBody>
       </p:sp>
     </p:spTree>
     <p:extLst>
       <p:ext uri="{BB962C8B-B14F-4D97-AF65-F5344CB8AC3E}">
-        <p14:creationId xmlns:p14="http://schemas.microsoft.com/office/powerpoint/2010/main" val="1805261730"/>
+        <p14:creationId xmlns:p14="http://schemas.microsoft.com/office/powerpoint/2010/main" val="2648057209"/>
+      </p:ext>
+    </p:extLst>
+  </p:cSld>
+  <p:clrMapOvr>
+    <a:masterClrMapping/>
+  </p:clrMapOvr>
+</p:sld>
+</file>
+
+<file path=ppt/slides/slide18.xml><?xml version="1.0" encoding="utf-8"?>
+<p:sld xmlns:a="http://schemas.openxmlformats.org/drawingml/2006/main" xmlns:r="http://schemas.openxmlformats.org/officeDocument/2006/relationships" xmlns:p="http://schemas.openxmlformats.org/presentationml/2006/main">
+  <p:cSld>
+    <p:spTree>
+      <p:nvGrpSpPr>
+        <p:cNvPr id="1" name=""/>
+        <p:cNvGrpSpPr/>
+        <p:nvPr/>
+      </p:nvGrpSpPr>
+      <p:grpSpPr>
+        <a:xfrm>
+          <a:off x="0" y="0"/>
+          <a:ext cx="0" cy="0"/>
+          <a:chOff x="0" y="0"/>
+          <a:chExt cx="0" cy="0"/>
+        </a:xfrm>
+      </p:grpSpPr>
+      <p:sp>
+        <p:nvSpPr>
+          <p:cNvPr id="2" name="object 2"/>
+          <p:cNvSpPr txBox="1">
+            <a:spLocks noGrp="1"/>
+          </p:cNvSpPr>
+          <p:nvPr>
+            <p:ph type="title"/>
+          </p:nvPr>
+        </p:nvSpPr>
+        <p:spPr>
+          <a:xfrm>
+            <a:off x="331250" y="250726"/>
+            <a:ext cx="8812750" cy="597599"/>
+          </a:xfrm>
+          <a:prstGeom prst="rect">
+            <a:avLst/>
+          </a:prstGeom>
+        </p:spPr>
+        <p:txBody>
+          <a:bodyPr vert="horz" wrap="square" lIns="0" tIns="12700" rIns="0" bIns="0" rtlCol="0">
+            <a:spAutoFit/>
+          </a:bodyPr>
+          <a:lstStyle/>
+          <a:p>
+            <a:pPr marL="12700">
+              <a:lnSpc>
+                <a:spcPct val="100000"/>
+              </a:lnSpc>
+              <a:spcBef>
+                <a:spcPts val="100"/>
+              </a:spcBef>
+            </a:pPr>
+            <a:r>
+              <a:rPr lang="en-CA" sz="3800" spc="-35" dirty="0" smtClean="0">
+                <a:solidFill>
+                  <a:srgbClr val="F1CD00"/>
+                </a:solidFill>
+              </a:rPr>
+              <a:t>Appendix C: Assumptions</a:t>
+            </a:r>
+            <a:endParaRPr sz="3800" dirty="0"/>
+          </a:p>
+        </p:txBody>
+      </p:sp>
+      <p:sp>
+        <p:nvSpPr>
+          <p:cNvPr id="7" name="object 7"/>
+          <p:cNvSpPr txBox="1">
+            <a:spLocks noGrp="1"/>
+          </p:cNvSpPr>
+          <p:nvPr>
+            <p:ph type="sldNum" sz="quarter" idx="7"/>
+          </p:nvPr>
+        </p:nvSpPr>
+        <p:spPr>
+          <a:prstGeom prst="rect">
+            <a:avLst/>
+          </a:prstGeom>
+        </p:spPr>
+        <p:txBody>
+          <a:bodyPr vert="horz" wrap="square" lIns="0" tIns="635" rIns="0" bIns="0" rtlCol="0">
+            <a:spAutoFit/>
+          </a:bodyPr>
+          <a:lstStyle/>
+          <a:p>
+            <a:pPr marL="38100">
+              <a:lnSpc>
+                <a:spcPct val="100000"/>
+              </a:lnSpc>
+              <a:spcBef>
+                <a:spcPts val="5"/>
+              </a:spcBef>
+            </a:pPr>
+            <a:fld id="{81D60167-4931-47E6-BA6A-407CBD079E47}" type="slidenum">
+              <a:rPr dirty="0"/>
+              <a:t>18</a:t>
+            </a:fld>
+            <a:endParaRPr dirty="0"/>
+          </a:p>
+        </p:txBody>
+      </p:sp>
+      <p:sp>
+        <p:nvSpPr>
+          <p:cNvPr id="4" name="TextBox 3"/>
+          <p:cNvSpPr txBox="1"/>
+          <p:nvPr/>
+        </p:nvSpPr>
+        <p:spPr>
+          <a:xfrm>
+            <a:off x="421603" y="1200150"/>
+            <a:ext cx="8153400" cy="2862322"/>
+          </a:xfrm>
+          <a:prstGeom prst="rect">
+            <a:avLst/>
+          </a:prstGeom>
+          <a:noFill/>
+        </p:spPr>
+        <p:txBody>
+          <a:bodyPr wrap="square" rtlCol="0">
+            <a:spAutoFit/>
+          </a:bodyPr>
+          <a:lstStyle/>
+          <a:p>
+            <a:pPr marL="228600" indent="-228600">
+              <a:buAutoNum type="arabicPeriod"/>
+            </a:pPr>
+            <a:r>
+              <a:rPr lang="en-CA" sz="1200" dirty="0" smtClean="0"/>
+              <a:t>Horizontal transmission through direct contact with infected</a:t>
+            </a:r>
+          </a:p>
+          <a:p>
+            <a:pPr marL="228600" indent="-228600">
+              <a:buAutoNum type="arabicPeriod"/>
+            </a:pPr>
+            <a:r>
+              <a:rPr lang="en-CA" sz="1200" dirty="0" smtClean="0"/>
+              <a:t>Homogeneous individual mixing</a:t>
+            </a:r>
+          </a:p>
+          <a:p>
+            <a:pPr marL="228600" indent="-228600">
+              <a:buAutoNum type="arabicPeriod"/>
+            </a:pPr>
+            <a:r>
+              <a:rPr lang="en-CA" sz="1200" dirty="0" smtClean="0"/>
+              <a:t>Rate of transfer proportional to population size of compartment</a:t>
+            </a:r>
+          </a:p>
+          <a:p>
+            <a:pPr marL="228600" indent="-228600">
+              <a:buAutoNum type="arabicPeriod"/>
+            </a:pPr>
+            <a:r>
+              <a:rPr lang="en-CA" sz="1200" dirty="0" smtClean="0"/>
+              <a:t>Infected individuals have latency period</a:t>
+            </a:r>
+          </a:p>
+          <a:p>
+            <a:pPr marL="228600" indent="-228600">
+              <a:buAutoNum type="arabicPeriod"/>
+            </a:pPr>
+            <a:r>
+              <a:rPr lang="en-CA" sz="1200" dirty="0" smtClean="0"/>
+              <a:t>No acquired immunity</a:t>
+            </a:r>
+          </a:p>
+          <a:p>
+            <a:pPr marL="228600" indent="-228600">
+              <a:buAutoNum type="arabicPeriod"/>
+            </a:pPr>
+            <a:r>
+              <a:rPr lang="en-CA" sz="1200" dirty="0" smtClean="0"/>
+              <a:t>No input or output of individuals through birth, migration, or death</a:t>
+            </a:r>
+          </a:p>
+          <a:p>
+            <a:pPr marL="228600" indent="-228600">
+              <a:buAutoNum type="arabicPeriod"/>
+            </a:pPr>
+            <a:r>
+              <a:rPr lang="en-CA" sz="1200" dirty="0" smtClean="0"/>
+              <a:t>Educated infected individuals quarantine and do not infect others</a:t>
+            </a:r>
+          </a:p>
+          <a:p>
+            <a:pPr marL="228600" indent="-228600">
+              <a:buAutoNum type="arabicPeriod"/>
+            </a:pPr>
+            <a:r>
+              <a:rPr lang="en-CA" sz="1200" dirty="0" smtClean="0"/>
+              <a:t>Education rate is constant for each compartment</a:t>
+            </a:r>
+          </a:p>
+          <a:p>
+            <a:pPr marL="228600" indent="-228600">
+              <a:buAutoNum type="arabicPeriod"/>
+            </a:pPr>
+            <a:r>
+              <a:rPr lang="en-CA" sz="1200" dirty="0" smtClean="0"/>
+              <a:t>Recovery rate is constant for each infected compartment</a:t>
+            </a:r>
+          </a:p>
+          <a:p>
+            <a:pPr marL="228600" indent="-228600">
+              <a:buAutoNum type="arabicPeriod"/>
+            </a:pPr>
+            <a:r>
+              <a:rPr lang="en-CA" sz="1200" dirty="0" smtClean="0"/>
+              <a:t>Individuals represented in data are considered not educated</a:t>
+            </a:r>
+          </a:p>
+          <a:p>
+            <a:pPr marL="228600" indent="-228600">
+              <a:buAutoNum type="arabicPeriod"/>
+            </a:pPr>
+            <a:r>
+              <a:rPr lang="en-CA" sz="1200" dirty="0" smtClean="0"/>
+              <a:t>Effectiveness of educational interventions studied are comparable to proposed mpox intervention</a:t>
+            </a:r>
+          </a:p>
+          <a:p>
+            <a:pPr marL="228600" indent="-228600">
+              <a:buAutoNum type="arabicPeriod"/>
+            </a:pPr>
+            <a:r>
+              <a:rPr lang="en-CA" sz="1200" dirty="0" smtClean="0"/>
+              <a:t>There is no vaccine</a:t>
+            </a:r>
+          </a:p>
+          <a:p>
+            <a:pPr marL="228600" indent="-228600">
+              <a:buAutoNum type="arabicPeriod"/>
+            </a:pPr>
+            <a:endParaRPr lang="en-CA" sz="1200" dirty="0"/>
+          </a:p>
+          <a:p>
+            <a:endParaRPr lang="en-CA" sz="1200" dirty="0"/>
+          </a:p>
+          <a:p>
+            <a:endParaRPr lang="en-CA" sz="1200" dirty="0"/>
+          </a:p>
+        </p:txBody>
+      </p:sp>
+    </p:spTree>
+    <p:extLst>
+      <p:ext uri="{BB962C8B-B14F-4D97-AF65-F5344CB8AC3E}">
+        <p14:creationId xmlns:p14="http://schemas.microsoft.com/office/powerpoint/2010/main" val="985514059"/>
+      </p:ext>
+    </p:extLst>
+  </p:cSld>
+  <p:clrMapOvr>
+    <a:masterClrMapping/>
+  </p:clrMapOvr>
+</p:sld>
+</file>
+
+<file path=ppt/slides/slide19.xml><?xml version="1.0" encoding="utf-8"?>
+<p:sld xmlns:a="http://schemas.openxmlformats.org/drawingml/2006/main" xmlns:r="http://schemas.openxmlformats.org/officeDocument/2006/relationships" xmlns:p="http://schemas.openxmlformats.org/presentationml/2006/main">
+  <p:cSld>
+    <p:spTree>
+      <p:nvGrpSpPr>
+        <p:cNvPr id="1" name=""/>
+        <p:cNvGrpSpPr/>
+        <p:nvPr/>
+      </p:nvGrpSpPr>
+      <p:grpSpPr>
+        <a:xfrm>
+          <a:off x="0" y="0"/>
+          <a:ext cx="0" cy="0"/>
+          <a:chOff x="0" y="0"/>
+          <a:chExt cx="0" cy="0"/>
+        </a:xfrm>
+      </p:grpSpPr>
+      <p:sp>
+        <p:nvSpPr>
+          <p:cNvPr id="2" name="object 2"/>
+          <p:cNvSpPr txBox="1">
+            <a:spLocks noGrp="1"/>
+          </p:cNvSpPr>
+          <p:nvPr>
+            <p:ph type="title"/>
+          </p:nvPr>
+        </p:nvSpPr>
+        <p:spPr>
+          <a:xfrm>
+            <a:off x="331250" y="250726"/>
+            <a:ext cx="8812750" cy="597599"/>
+          </a:xfrm>
+          <a:prstGeom prst="rect">
+            <a:avLst/>
+          </a:prstGeom>
+        </p:spPr>
+        <p:txBody>
+          <a:bodyPr vert="horz" wrap="square" lIns="0" tIns="12700" rIns="0" bIns="0" rtlCol="0">
+            <a:spAutoFit/>
+          </a:bodyPr>
+          <a:lstStyle/>
+          <a:p>
+            <a:pPr marL="12700">
+              <a:lnSpc>
+                <a:spcPct val="100000"/>
+              </a:lnSpc>
+              <a:spcBef>
+                <a:spcPts val="100"/>
+              </a:spcBef>
+            </a:pPr>
+            <a:r>
+              <a:rPr lang="en-CA" sz="3800" spc="-35" dirty="0" smtClean="0">
+                <a:solidFill>
+                  <a:srgbClr val="F1CD00"/>
+                </a:solidFill>
+              </a:rPr>
+              <a:t>Appendix D: Stability Analysis</a:t>
+            </a:r>
+            <a:endParaRPr sz="3800" dirty="0"/>
+          </a:p>
+        </p:txBody>
+      </p:sp>
+      <p:sp>
+        <p:nvSpPr>
+          <p:cNvPr id="4" name="TextBox 3"/>
+          <p:cNvSpPr txBox="1"/>
+          <p:nvPr/>
+        </p:nvSpPr>
+        <p:spPr>
+          <a:xfrm>
+            <a:off x="421603" y="1200150"/>
+            <a:ext cx="8153400" cy="646331"/>
+          </a:xfrm>
+          <a:prstGeom prst="rect">
+            <a:avLst/>
+          </a:prstGeom>
+          <a:noFill/>
+        </p:spPr>
+        <p:txBody>
+          <a:bodyPr wrap="square" rtlCol="0">
+            <a:spAutoFit/>
+          </a:bodyPr>
+          <a:lstStyle/>
+          <a:p>
+            <a:pPr marL="228600" indent="-228600">
+              <a:buAutoNum type="arabicPeriod"/>
+            </a:pPr>
+            <a:endParaRPr lang="en-CA" sz="1200" dirty="0"/>
+          </a:p>
+          <a:p>
+            <a:endParaRPr lang="en-CA" sz="1200" dirty="0"/>
+          </a:p>
+          <a:p>
+            <a:endParaRPr lang="en-CA" sz="1200" dirty="0"/>
+          </a:p>
+        </p:txBody>
+      </p:sp>
+      <p:pic>
+        <p:nvPicPr>
+          <p:cNvPr id="1027" name="Picture 3"/>
+          <p:cNvPicPr>
+            <a:picLocks noChangeAspect="1" noChangeArrowheads="1"/>
+          </p:cNvPicPr>
+          <p:nvPr/>
+        </p:nvPicPr>
+        <p:blipFill>
+          <a:blip r:embed="rId3">
+            <a:extLst>
+              <a:ext uri="{28A0092B-C50C-407E-A947-70E740481C1C}">
+                <a14:useLocalDpi xmlns:a14="http://schemas.microsoft.com/office/drawing/2010/main" val="0"/>
+              </a:ext>
+            </a:extLst>
+          </a:blip>
+          <a:srcRect/>
+          <a:stretch>
+            <a:fillRect/>
+          </a:stretch>
+        </p:blipFill>
+        <p:spPr bwMode="auto">
+          <a:xfrm>
+            <a:off x="4800600" y="2745830"/>
+            <a:ext cx="4339507" cy="2397669"/>
+          </a:xfrm>
+          <a:prstGeom prst="rect">
+            <a:avLst/>
+          </a:prstGeom>
+          <a:noFill/>
+          <a:ln>
+            <a:noFill/>
+          </a:ln>
+          <a:effectLst/>
+          <a:extLst>
+            <a:ext uri="{909E8E84-426E-40DD-AFC4-6F175D3DCCD1}">
+              <a14:hiddenFill xmlns:a14="http://schemas.microsoft.com/office/drawing/2010/main">
+                <a:solidFill>
+                  <a:schemeClr val="accent1"/>
+                </a:solidFill>
+              </a14:hiddenFill>
+            </a:ext>
+            <a:ext uri="{91240B29-F687-4F45-9708-019B960494DF}">
+              <a14:hiddenLine xmlns:a14="http://schemas.microsoft.com/office/drawing/2010/main" w="9525">
+                <a:solidFill>
+                  <a:schemeClr val="tx1"/>
+                </a:solidFill>
+                <a:miter lim="800000"/>
+                <a:headEnd/>
+                <a:tailEnd/>
+              </a14:hiddenLine>
+            </a:ext>
+            <a:ext uri="{AF507438-7753-43E0-B8FC-AC1667EBCBE1}">
+              <a14:hiddenEffects xmlns:a14="http://schemas.microsoft.com/office/drawing/2010/main">
+                <a:effectLst>
+                  <a:outerShdw dist="35921" dir="2700000" algn="ctr" rotWithShape="0">
+                    <a:schemeClr val="bg2"/>
+                  </a:outerShdw>
+                </a:effectLst>
+              </a14:hiddenEffects>
+            </a:ext>
+          </a:extLst>
+        </p:spPr>
+      </p:pic>
+      <p:pic>
+        <p:nvPicPr>
+          <p:cNvPr id="1028" name="Picture 4"/>
+          <p:cNvPicPr>
+            <a:picLocks noChangeAspect="1" noChangeArrowheads="1"/>
+          </p:cNvPicPr>
+          <p:nvPr/>
+        </p:nvPicPr>
+        <p:blipFill>
+          <a:blip r:embed="rId4">
+            <a:extLst>
+              <a:ext uri="{28A0092B-C50C-407E-A947-70E740481C1C}">
+                <a14:useLocalDpi xmlns:a14="http://schemas.microsoft.com/office/drawing/2010/main" val="0"/>
+              </a:ext>
+            </a:extLst>
+          </a:blip>
+          <a:srcRect/>
+          <a:stretch>
+            <a:fillRect/>
+          </a:stretch>
+        </p:blipFill>
+        <p:spPr bwMode="auto">
+          <a:xfrm>
+            <a:off x="0" y="2800350"/>
+            <a:ext cx="4217883" cy="2329278"/>
+          </a:xfrm>
+          <a:prstGeom prst="rect">
+            <a:avLst/>
+          </a:prstGeom>
+          <a:noFill/>
+          <a:ln>
+            <a:noFill/>
+          </a:ln>
+          <a:effectLst/>
+          <a:extLst>
+            <a:ext uri="{909E8E84-426E-40DD-AFC4-6F175D3DCCD1}">
+              <a14:hiddenFill xmlns:a14="http://schemas.microsoft.com/office/drawing/2010/main">
+                <a:solidFill>
+                  <a:schemeClr val="accent1"/>
+                </a:solidFill>
+              </a14:hiddenFill>
+            </a:ext>
+            <a:ext uri="{91240B29-F687-4F45-9708-019B960494DF}">
+              <a14:hiddenLine xmlns:a14="http://schemas.microsoft.com/office/drawing/2010/main" w="9525">
+                <a:solidFill>
+                  <a:schemeClr val="tx1"/>
+                </a:solidFill>
+                <a:miter lim="800000"/>
+                <a:headEnd/>
+                <a:tailEnd/>
+              </a14:hiddenLine>
+            </a:ext>
+            <a:ext uri="{AF507438-7753-43E0-B8FC-AC1667EBCBE1}">
+              <a14:hiddenEffects xmlns:a14="http://schemas.microsoft.com/office/drawing/2010/main">
+                <a:effectLst>
+                  <a:outerShdw dist="35921" dir="2700000" algn="ctr" rotWithShape="0">
+                    <a:schemeClr val="bg2"/>
+                  </a:outerShdw>
+                </a:effectLst>
+              </a14:hiddenEffects>
+            </a:ext>
+          </a:extLst>
+        </p:spPr>
+      </p:pic>
+      <p:pic>
+        <p:nvPicPr>
+          <p:cNvPr id="1029" name="Picture 5"/>
+          <p:cNvPicPr>
+            <a:picLocks noChangeAspect="1" noChangeArrowheads="1"/>
+          </p:cNvPicPr>
+          <p:nvPr/>
+        </p:nvPicPr>
+        <p:blipFill>
+          <a:blip r:embed="rId5">
+            <a:extLst>
+              <a:ext uri="{28A0092B-C50C-407E-A947-70E740481C1C}">
+                <a14:useLocalDpi xmlns:a14="http://schemas.microsoft.com/office/drawing/2010/main" val="0"/>
+              </a:ext>
+            </a:extLst>
+          </a:blip>
+          <a:srcRect/>
+          <a:stretch>
+            <a:fillRect/>
+          </a:stretch>
+        </p:blipFill>
+        <p:spPr bwMode="auto">
+          <a:xfrm>
+            <a:off x="421603" y="1294031"/>
+            <a:ext cx="5410200" cy="1104900"/>
+          </a:xfrm>
+          <a:prstGeom prst="rect">
+            <a:avLst/>
+          </a:prstGeom>
+          <a:noFill/>
+          <a:ln>
+            <a:noFill/>
+          </a:ln>
+          <a:effectLst/>
+          <a:extLst>
+            <a:ext uri="{909E8E84-426E-40DD-AFC4-6F175D3DCCD1}">
+              <a14:hiddenFill xmlns:a14="http://schemas.microsoft.com/office/drawing/2010/main">
+                <a:solidFill>
+                  <a:schemeClr val="accent1"/>
+                </a:solidFill>
+              </a14:hiddenFill>
+            </a:ext>
+            <a:ext uri="{91240B29-F687-4F45-9708-019B960494DF}">
+              <a14:hiddenLine xmlns:a14="http://schemas.microsoft.com/office/drawing/2010/main" w="9525">
+                <a:solidFill>
+                  <a:schemeClr val="tx1"/>
+                </a:solidFill>
+                <a:miter lim="800000"/>
+                <a:headEnd/>
+                <a:tailEnd/>
+              </a14:hiddenLine>
+            </a:ext>
+            <a:ext uri="{AF507438-7753-43E0-B8FC-AC1667EBCBE1}">
+              <a14:hiddenEffects xmlns:a14="http://schemas.microsoft.com/office/drawing/2010/main">
+                <a:effectLst>
+                  <a:outerShdw dist="35921" dir="2700000" algn="ctr" rotWithShape="0">
+                    <a:schemeClr val="bg2"/>
+                  </a:outerShdw>
+                </a:effectLst>
+              </a14:hiddenEffects>
+            </a:ext>
+          </a:extLst>
+        </p:spPr>
+      </p:pic>
+    </p:spTree>
+    <p:extLst>
+      <p:ext uri="{BB962C8B-B14F-4D97-AF65-F5344CB8AC3E}">
+        <p14:creationId xmlns:p14="http://schemas.microsoft.com/office/powerpoint/2010/main" val="3111824713"/>
       </p:ext>
     </p:extLst>
   </p:cSld>
@@ -4728,7 +6848,7 @@
         </p:blipFill>
         <p:spPr>
           <a:xfrm>
-            <a:off x="927100" y="3273958"/>
+            <a:off x="5494187" y="4315793"/>
             <a:ext cx="431800" cy="431125"/>
           </a:xfrm>
           <a:prstGeom prst="rect">
@@ -4744,7 +6864,7 @@
         </p:nvSpPr>
         <p:spPr>
           <a:xfrm>
-            <a:off x="1351113" y="3358715"/>
+            <a:off x="5918200" y="4400550"/>
             <a:ext cx="2463800" cy="261610"/>
           </a:xfrm>
           <a:prstGeom prst="rect">
@@ -5464,23 +7584,7 @@
           <a:p>
             <a:r>
               <a:rPr lang="en-CA" sz="1100" i="1" dirty="0" smtClean="0"/>
-              <a:t>Effective Evidence-Based Programs for Preventing Sexually Transmitted Infections: A Meta Analysis; </a:t>
-            </a:r>
-            <a:r>
-              <a:rPr lang="en-CA" sz="1100" i="1" dirty="0" err="1" smtClean="0"/>
-              <a:t>Petrova</a:t>
-            </a:r>
-            <a:r>
-              <a:rPr lang="en-CA" sz="1100" i="1" dirty="0" smtClean="0"/>
-              <a:t>, D &amp; Garcia-</a:t>
-            </a:r>
-            <a:r>
-              <a:rPr lang="en-CA" sz="1100" i="1" dirty="0" err="1" smtClean="0"/>
-              <a:t>Retamero</a:t>
-            </a:r>
-            <a:r>
-              <a:rPr lang="en-CA" sz="1100" i="1" dirty="0" smtClean="0"/>
-              <a:t>, R; 2015</a:t>
+              <a:t>Effective Evidence-Based Programs for Preventing Sexually Transmitted Infections: A Meta Analysis; Petrova, D &amp; Garcia-Retamero, R; 2015</a:t>
             </a:r>
             <a:endParaRPr lang="en-CA" sz="1100" i="1" dirty="0"/>
           </a:p>
@@ -5510,15 +7614,7 @@
           <a:p>
             <a:r>
               <a:rPr lang="en-CA" sz="1100" dirty="0" smtClean="0"/>
-              <a:t>We assume effectiveness of educational interventions studied will be comparable to </a:t>
-            </a:r>
-            <a:r>
-              <a:rPr lang="en-CA" sz="1100" dirty="0" err="1" smtClean="0"/>
-              <a:t>Mpox</a:t>
-            </a:r>
-            <a:r>
-              <a:rPr lang="en-CA" sz="1100" dirty="0" smtClean="0"/>
-              <a:t> intervention</a:t>
+              <a:t>We assume effectiveness of educational interventions studied will be comparable to Mpox intervention</a:t>
             </a:r>
             <a:endParaRPr lang="en-CA" sz="1100" dirty="0"/>
           </a:p>
@@ -5628,7 +7724,7 @@
           <a:lstStyle/>
           <a:p>
             <a:pPr algn="ctr"/>
-            <a:endParaRPr lang="en-CA"/>
+            <a:endParaRPr lang="en-CA" dirty="0"/>
           </a:p>
         </p:txBody>
       </p:sp>
@@ -6393,8 +8489,8 @@
         </p:nvSpPr>
         <p:spPr>
           <a:xfrm>
-            <a:off x="390733" y="3771840"/>
-            <a:ext cx="2133600" cy="400110"/>
+            <a:off x="311751" y="3648730"/>
+            <a:ext cx="2758868" cy="523220"/>
           </a:xfrm>
           <a:prstGeom prst="rect">
             <a:avLst/>
@@ -6408,7 +8504,7 @@
           <a:lstStyle/>
           <a:p>
             <a:r>
-              <a:rPr lang="en-CA" sz="2000" dirty="0" smtClean="0">
+              <a:rPr lang="en-CA" sz="2800" dirty="0" smtClean="0">
                 <a:solidFill>
                   <a:schemeClr val="accent1">
                     <a:lumMod val="75000"/>
@@ -6417,7 +8513,7 @@
               </a:rPr>
               <a:t>Educated Stream</a:t>
             </a:r>
-            <a:endParaRPr lang="en-CA" sz="2000" dirty="0">
+            <a:endParaRPr lang="en-CA" sz="2800" dirty="0">
               <a:solidFill>
                 <a:schemeClr val="accent1">
                   <a:lumMod val="75000"/>
@@ -6703,15 +8799,7 @@
           <a:p>
             <a:r>
               <a:rPr lang="en-CA" sz="1100" dirty="0" smtClean="0"/>
-              <a:t>We assume data only includes people who have not received </a:t>
-            </a:r>
-            <a:r>
-              <a:rPr lang="en-CA" sz="1100" dirty="0" err="1" smtClean="0"/>
-              <a:t>Mpox</a:t>
-            </a:r>
-            <a:r>
-              <a:rPr lang="en-CA" sz="1100" dirty="0" smtClean="0"/>
-              <a:t> education</a:t>
+              <a:t>We assume data only includes people who have not received Mpox education</a:t>
             </a:r>
             <a:endParaRPr lang="en-CA" sz="1100" dirty="0"/>
           </a:p>

</xml_diff>